<commit_message>
[arch] update MDTP handshake figure
</commit_message>
<xml_diff>
--- a/arch/CybertwinSimArch.pptx
+++ b/arch/CybertwinSimArch.pptx
@@ -235,7 +235,7 @@
           <a:p>
             <a:fld id="{8B53DC8C-93B3-6741-B9FD-FAE061E511FF}" type="datetimeFigureOut">
               <a:rPr kumimoji="1" lang="zh-CN" altLang="en-US" smtClean="0"/>
-              <a:t>2023/6/16</a:t>
+              <a:t>2023/6/17</a:t>
             </a:fld>
             <a:endParaRPr kumimoji="1" lang="zh-CN" altLang="en-US"/>
           </a:p>
@@ -901,7 +901,7 @@
           <a:p>
             <a:fld id="{A628586D-C04B-DD40-AE90-D0D282D0CC3F}" type="datetimeFigureOut">
               <a:rPr kumimoji="1" lang="zh-CN" altLang="en-US" smtClean="0"/>
-              <a:t>2023/6/16</a:t>
+              <a:t>2023/6/17</a:t>
             </a:fld>
             <a:endParaRPr kumimoji="1" lang="zh-CN" altLang="en-US"/>
           </a:p>
@@ -1099,7 +1099,7 @@
           <a:p>
             <a:fld id="{A628586D-C04B-DD40-AE90-D0D282D0CC3F}" type="datetimeFigureOut">
               <a:rPr kumimoji="1" lang="zh-CN" altLang="en-US" smtClean="0"/>
-              <a:t>2023/6/16</a:t>
+              <a:t>2023/6/17</a:t>
             </a:fld>
             <a:endParaRPr kumimoji="1" lang="zh-CN" altLang="en-US"/>
           </a:p>
@@ -1307,7 +1307,7 @@
           <a:p>
             <a:fld id="{A628586D-C04B-DD40-AE90-D0D282D0CC3F}" type="datetimeFigureOut">
               <a:rPr kumimoji="1" lang="zh-CN" altLang="en-US" smtClean="0"/>
-              <a:t>2023/6/16</a:t>
+              <a:t>2023/6/17</a:t>
             </a:fld>
             <a:endParaRPr kumimoji="1" lang="zh-CN" altLang="en-US"/>
           </a:p>
@@ -1505,7 +1505,7 @@
           <a:p>
             <a:fld id="{A628586D-C04B-DD40-AE90-D0D282D0CC3F}" type="datetimeFigureOut">
               <a:rPr kumimoji="1" lang="zh-CN" altLang="en-US" smtClean="0"/>
-              <a:t>2023/6/16</a:t>
+              <a:t>2023/6/17</a:t>
             </a:fld>
             <a:endParaRPr kumimoji="1" lang="zh-CN" altLang="en-US"/>
           </a:p>
@@ -1780,7 +1780,7 @@
           <a:p>
             <a:fld id="{A628586D-C04B-DD40-AE90-D0D282D0CC3F}" type="datetimeFigureOut">
               <a:rPr kumimoji="1" lang="zh-CN" altLang="en-US" smtClean="0"/>
-              <a:t>2023/6/16</a:t>
+              <a:t>2023/6/17</a:t>
             </a:fld>
             <a:endParaRPr kumimoji="1" lang="zh-CN" altLang="en-US"/>
           </a:p>
@@ -2045,7 +2045,7 @@
           <a:p>
             <a:fld id="{A628586D-C04B-DD40-AE90-D0D282D0CC3F}" type="datetimeFigureOut">
               <a:rPr kumimoji="1" lang="zh-CN" altLang="en-US" smtClean="0"/>
-              <a:t>2023/6/16</a:t>
+              <a:t>2023/6/17</a:t>
             </a:fld>
             <a:endParaRPr kumimoji="1" lang="zh-CN" altLang="en-US"/>
           </a:p>
@@ -2457,7 +2457,7 @@
           <a:p>
             <a:fld id="{A628586D-C04B-DD40-AE90-D0D282D0CC3F}" type="datetimeFigureOut">
               <a:rPr kumimoji="1" lang="zh-CN" altLang="en-US" smtClean="0"/>
-              <a:t>2023/6/16</a:t>
+              <a:t>2023/6/17</a:t>
             </a:fld>
             <a:endParaRPr kumimoji="1" lang="zh-CN" altLang="en-US"/>
           </a:p>
@@ -2598,7 +2598,7 @@
           <a:p>
             <a:fld id="{A628586D-C04B-DD40-AE90-D0D282D0CC3F}" type="datetimeFigureOut">
               <a:rPr kumimoji="1" lang="zh-CN" altLang="en-US" smtClean="0"/>
-              <a:t>2023/6/16</a:t>
+              <a:t>2023/6/17</a:t>
             </a:fld>
             <a:endParaRPr kumimoji="1" lang="zh-CN" altLang="en-US"/>
           </a:p>
@@ -2711,7 +2711,7 @@
           <a:p>
             <a:fld id="{A628586D-C04B-DD40-AE90-D0D282D0CC3F}" type="datetimeFigureOut">
               <a:rPr kumimoji="1" lang="zh-CN" altLang="en-US" smtClean="0"/>
-              <a:t>2023/6/16</a:t>
+              <a:t>2023/6/17</a:t>
             </a:fld>
             <a:endParaRPr kumimoji="1" lang="zh-CN" altLang="en-US"/>
           </a:p>
@@ -3022,7 +3022,7 @@
           <a:p>
             <a:fld id="{A628586D-C04B-DD40-AE90-D0D282D0CC3F}" type="datetimeFigureOut">
               <a:rPr kumimoji="1" lang="zh-CN" altLang="en-US" smtClean="0"/>
-              <a:t>2023/6/16</a:t>
+              <a:t>2023/6/17</a:t>
             </a:fld>
             <a:endParaRPr kumimoji="1" lang="zh-CN" altLang="en-US"/>
           </a:p>
@@ -3310,7 +3310,7 @@
           <a:p>
             <a:fld id="{A628586D-C04B-DD40-AE90-D0D282D0CC3F}" type="datetimeFigureOut">
               <a:rPr kumimoji="1" lang="zh-CN" altLang="en-US" smtClean="0"/>
-              <a:t>2023/6/16</a:t>
+              <a:t>2023/6/17</a:t>
             </a:fld>
             <a:endParaRPr kumimoji="1" lang="zh-CN" altLang="en-US"/>
           </a:p>
@@ -3551,7 +3551,7 @@
           <a:p>
             <a:fld id="{A628586D-C04B-DD40-AE90-D0D282D0CC3F}" type="datetimeFigureOut">
               <a:rPr kumimoji="1" lang="zh-CN" altLang="en-US" smtClean="0"/>
-              <a:t>2023/6/16</a:t>
+              <a:t>2023/6/17</a:t>
             </a:fld>
             <a:endParaRPr kumimoji="1" lang="zh-CN" altLang="en-US"/>
           </a:p>
@@ -4071,9 +4071,9 @@
           <p:nvPr/>
         </p:nvCxnSpPr>
         <p:spPr>
-          <a:xfrm>
-            <a:off x="3448719" y="778790"/>
-            <a:ext cx="0" cy="3949430"/>
+          <a:xfrm flipH="1">
+            <a:off x="4794478" y="941628"/>
+            <a:ext cx="19575" cy="3325572"/>
           </a:xfrm>
           <a:prstGeom prst="line">
             <a:avLst/>
@@ -4114,9 +4114,9 @@
           <p:nvPr/>
         </p:nvCxnSpPr>
         <p:spPr>
-          <a:xfrm flipH="1">
-            <a:off x="5308272" y="792795"/>
-            <a:ext cx="7" cy="3949430"/>
+          <a:xfrm>
+            <a:off x="6673613" y="955633"/>
+            <a:ext cx="7066" cy="3372527"/>
           </a:xfrm>
           <a:prstGeom prst="line">
             <a:avLst/>
@@ -4158,8 +4158,8 @@
         </p:nvCxnSpPr>
         <p:spPr>
           <a:xfrm>
-            <a:off x="3091757" y="1046845"/>
-            <a:ext cx="2231892" cy="192843"/>
+            <a:off x="4475057" y="1287183"/>
+            <a:ext cx="2179960" cy="83247"/>
           </a:xfrm>
           <a:prstGeom prst="straightConnector1">
             <a:avLst/>
@@ -4202,8 +4202,8 @@
         </p:nvCxnSpPr>
         <p:spPr>
           <a:xfrm>
-            <a:off x="3448719" y="1267502"/>
-            <a:ext cx="2208837" cy="159382"/>
+            <a:off x="4818405" y="1501642"/>
+            <a:ext cx="2204485" cy="88080"/>
           </a:xfrm>
           <a:prstGeom prst="straightConnector1">
             <a:avLst/>
@@ -4246,8 +4246,8 @@
         </p:nvCxnSpPr>
         <p:spPr>
           <a:xfrm flipH="1">
-            <a:off x="3062703" y="1282174"/>
-            <a:ext cx="2245569" cy="248463"/>
+            <a:off x="4475057" y="1438051"/>
+            <a:ext cx="2175899" cy="200641"/>
           </a:xfrm>
           <a:prstGeom prst="straightConnector1">
             <a:avLst/>
@@ -4290,8 +4290,8 @@
         </p:nvCxnSpPr>
         <p:spPr>
           <a:xfrm flipH="1">
-            <a:off x="3419384" y="1463803"/>
-            <a:ext cx="2199992" cy="321760"/>
+            <a:off x="4818405" y="1721165"/>
+            <a:ext cx="2177675" cy="222550"/>
           </a:xfrm>
           <a:prstGeom prst="straightConnector1">
             <a:avLst/>
@@ -4334,8 +4334,8 @@
         </p:nvCxnSpPr>
         <p:spPr>
           <a:xfrm>
-            <a:off x="3099435" y="2004670"/>
-            <a:ext cx="2224214" cy="298647"/>
+            <a:off x="4462143" y="2272921"/>
+            <a:ext cx="2192874" cy="142265"/>
           </a:xfrm>
           <a:prstGeom prst="straightConnector1">
             <a:avLst/>
@@ -4378,8 +4378,8 @@
         </p:nvCxnSpPr>
         <p:spPr>
           <a:xfrm flipH="1">
-            <a:off x="3062703" y="2342586"/>
-            <a:ext cx="2222423" cy="516203"/>
+            <a:off x="4447069" y="2780975"/>
+            <a:ext cx="2207948" cy="157349"/>
           </a:xfrm>
           <a:prstGeom prst="straightConnector1">
             <a:avLst/>
@@ -4422,13 +4422,16 @@
         </p:nvCxnSpPr>
         <p:spPr>
           <a:xfrm>
-            <a:off x="3131945" y="3092966"/>
-            <a:ext cx="2562689" cy="383290"/>
+            <a:off x="4476685" y="3385067"/>
+            <a:ext cx="2176703" cy="125595"/>
           </a:xfrm>
           <a:prstGeom prst="straightConnector1">
             <a:avLst/>
           </a:prstGeom>
-          <a:ln>
+          <a:ln w="12700">
+            <a:solidFill>
+              <a:srgbClr val="FFC000"/>
+            </a:solidFill>
             <a:tailEnd type="triangle"/>
           </a:ln>
         </p:spPr>
@@ -4463,8 +4466,8 @@
         </p:nvCxnSpPr>
         <p:spPr>
           <a:xfrm flipH="1">
-            <a:off x="3081735" y="2838040"/>
-            <a:ext cx="2588938" cy="522487"/>
+            <a:off x="4805215" y="3006796"/>
+            <a:ext cx="2187608" cy="201413"/>
           </a:xfrm>
           <a:prstGeom prst="straightConnector1">
             <a:avLst/>
@@ -4504,47 +4507,8 @@
         </p:nvCxnSpPr>
         <p:spPr>
           <a:xfrm>
-            <a:off x="3432204" y="2447647"/>
-            <a:ext cx="2207669" cy="260931"/>
-          </a:xfrm>
-          <a:prstGeom prst="straightConnector1">
-            <a:avLst/>
-          </a:prstGeom>
-          <a:ln>
-            <a:tailEnd type="triangle"/>
-          </a:ln>
-        </p:spPr>
-        <p:style>
-          <a:lnRef idx="1">
-            <a:schemeClr val="accent1"/>
-          </a:lnRef>
-          <a:fillRef idx="0">
-            <a:schemeClr val="accent1"/>
-          </a:fillRef>
-          <a:effectRef idx="0">
-            <a:schemeClr val="accent1"/>
-          </a:effectRef>
-          <a:fontRef idx="minor">
-            <a:schemeClr val="tx1"/>
-          </a:fontRef>
-        </p:style>
-      </p:cxnSp>
-      <p:cxnSp>
-        <p:nvCxnSpPr>
-          <p:cNvPr id="70" name="直接箭头连接符 69">
-            <a:extLst>
-              <a:ext uri="{FF2B5EF4-FFF2-40B4-BE49-F238E27FC236}">
-                <a16:creationId xmlns:a16="http://schemas.microsoft.com/office/drawing/2014/main" id="{5FD5ACB9-0F91-6A4B-1C32-5CE3C14F37E4}"/>
-              </a:ext>
-            </a:extLst>
-          </p:cNvPr>
-          <p:cNvCxnSpPr/>
-          <p:nvPr/>
-        </p:nvCxnSpPr>
-        <p:spPr>
-          <a:xfrm>
-            <a:off x="3933495" y="4231416"/>
-            <a:ext cx="2876145" cy="311285"/>
+            <a:off x="4807578" y="2532359"/>
+            <a:ext cx="2206467" cy="145515"/>
           </a:xfrm>
           <a:prstGeom prst="straightConnector1">
             <a:avLst/>
@@ -4582,7 +4546,7 @@
         </p:nvSpPr>
         <p:spPr>
           <a:xfrm>
-            <a:off x="3483619" y="953959"/>
+            <a:off x="4848953" y="1116797"/>
             <a:ext cx="611065" cy="200055"/>
           </a:xfrm>
           <a:prstGeom prst="rect">
@@ -4618,7 +4582,7 @@
         </p:nvSpPr>
         <p:spPr>
           <a:xfrm>
-            <a:off x="3857669" y="1173649"/>
+            <a:off x="5365147" y="1342508"/>
             <a:ext cx="611065" cy="200055"/>
           </a:xfrm>
           <a:prstGeom prst="rect">
@@ -4654,7 +4618,7 @@
         </p:nvSpPr>
         <p:spPr>
           <a:xfrm>
-            <a:off x="3471866" y="1388376"/>
+            <a:off x="4837200" y="1551214"/>
             <a:ext cx="614271" cy="200055"/>
           </a:xfrm>
           <a:prstGeom prst="rect">
@@ -4690,7 +4654,7 @@
         </p:nvSpPr>
         <p:spPr>
           <a:xfrm>
-            <a:off x="3860072" y="1639128"/>
+            <a:off x="5382524" y="1829922"/>
             <a:ext cx="614271" cy="200055"/>
           </a:xfrm>
           <a:prstGeom prst="rect">
@@ -4726,8 +4690,8 @@
         </p:nvSpPr>
         <p:spPr>
           <a:xfrm>
-            <a:off x="3212849" y="1933975"/>
-            <a:ext cx="1643399" cy="200055"/>
+            <a:off x="4570365" y="2185149"/>
+            <a:ext cx="1340432" cy="200055"/>
           </a:xfrm>
           <a:prstGeom prst="rect">
             <a:avLst/>
@@ -4742,7 +4706,7 @@
           <a:p>
             <a:r>
               <a:rPr lang="en-US" altLang="zh-CN" sz="700" b="1" dirty="0"/>
-              <a:t>PATH1 CUID1, Path ID1, Sender Key</a:t>
+              <a:t>CUID1, Path ID1, Sender Key</a:t>
             </a:r>
             <a:endParaRPr lang="zh-CN" altLang="en-US" sz="700" b="1" dirty="0"/>
           </a:p>
@@ -4762,8 +4726,8 @@
         </p:nvSpPr>
         <p:spPr>
           <a:xfrm>
-            <a:off x="3183193" y="2637756"/>
-            <a:ext cx="1702710" cy="200055"/>
+            <a:off x="4614032" y="2769262"/>
+            <a:ext cx="1452642" cy="200055"/>
           </a:xfrm>
           <a:prstGeom prst="rect">
             <a:avLst/>
@@ -4778,7 +4742,7 @@
           <a:p>
             <a:r>
               <a:rPr lang="en-US" altLang="zh-CN" sz="700" b="1" dirty="0"/>
-              <a:t>PATH1 CUID2, Path ID1, Receiver Key</a:t>
+              <a:t>CUID2, Path ID1, Receiver Key</a:t>
             </a:r>
             <a:endParaRPr lang="zh-CN" altLang="en-US" sz="700" b="1" dirty="0"/>
           </a:p>
@@ -4786,10 +4750,10 @@
       </p:sp>
       <p:sp>
         <p:nvSpPr>
-          <p:cNvPr id="82" name="文本框 81">
-            <a:extLst>
-              <a:ext uri="{FF2B5EF4-FFF2-40B4-BE49-F238E27FC236}">
-                <a16:creationId xmlns:a16="http://schemas.microsoft.com/office/drawing/2014/main" id="{2EE0B6F6-1BD9-3D00-D48B-5FA6BAE11FB9}"/>
+          <p:cNvPr id="83" name="文本框 82">
+            <a:extLst>
+              <a:ext uri="{FF2B5EF4-FFF2-40B4-BE49-F238E27FC236}">
+                <a16:creationId xmlns:a16="http://schemas.microsoft.com/office/drawing/2014/main" id="{A4823D2B-FCFD-87A6-3DC2-910CDB82CB07}"/>
               </a:ext>
             </a:extLst>
           </p:cNvPr>
@@ -4798,8 +4762,8 @@
         </p:nvSpPr>
         <p:spPr>
           <a:xfrm>
-            <a:off x="4858447" y="3460783"/>
-            <a:ext cx="952505" cy="276999"/>
+            <a:off x="4632207" y="3301300"/>
+            <a:ext cx="1342034" cy="307777"/>
           </a:xfrm>
           <a:prstGeom prst="rect">
             <a:avLst/>
@@ -4813,140 +4777,12 @@
           <a:lstStyle/>
           <a:p>
             <a:r>
-              <a:rPr lang="en-US" altLang="zh-CN" sz="1200" dirty="0"/>
-              <a:t>PATH2 SYN</a:t>
+              <a:rPr lang="en-US" altLang="zh-CN" sz="700" b="1" dirty="0"/>
+              <a:t>Path ID1, Conn ID, Data Seq </a:t>
             </a:r>
-            <a:endParaRPr lang="zh-CN" altLang="en-US" sz="1200" dirty="0"/>
           </a:p>
-        </p:txBody>
-      </p:sp>
-      <p:sp>
-        <p:nvSpPr>
-          <p:cNvPr id="83" name="文本框 82">
-            <a:extLst>
-              <a:ext uri="{FF2B5EF4-FFF2-40B4-BE49-F238E27FC236}">
-                <a16:creationId xmlns:a16="http://schemas.microsoft.com/office/drawing/2014/main" id="{A4823D2B-FCFD-87A6-3DC2-910CDB82CB07}"/>
-              </a:ext>
-            </a:extLst>
-          </p:cNvPr>
-          <p:cNvSpPr txBox="1"/>
-          <p:nvPr/>
-        </p:nvSpPr>
-        <p:spPr>
-          <a:xfrm>
-            <a:off x="4234924" y="3542971"/>
-            <a:ext cx="566181" cy="276999"/>
-          </a:xfrm>
-          <a:prstGeom prst="rect">
-            <a:avLst/>
-          </a:prstGeom>
-          <a:noFill/>
-        </p:spPr>
-        <p:txBody>
-          <a:bodyPr wrap="none" rtlCol="0">
-            <a:spAutoFit/>
-          </a:bodyPr>
-          <a:lstStyle/>
           <a:p>
-            <a:r>
-              <a:rPr lang="en-US" altLang="zh-CN" sz="1200" dirty="0"/>
-              <a:t>DATA</a:t>
-            </a:r>
-            <a:endParaRPr lang="zh-CN" altLang="en-US" sz="1200" dirty="0"/>
-          </a:p>
-        </p:txBody>
-      </p:sp>
-      <p:sp>
-        <p:nvSpPr>
-          <p:cNvPr id="86" name="左大括号 85">
-            <a:extLst>
-              <a:ext uri="{FF2B5EF4-FFF2-40B4-BE49-F238E27FC236}">
-                <a16:creationId xmlns:a16="http://schemas.microsoft.com/office/drawing/2014/main" id="{2AC5FB17-3E30-BC9A-F1EC-2D909FC66B69}"/>
-              </a:ext>
-            </a:extLst>
-          </p:cNvPr>
-          <p:cNvSpPr/>
-          <p:nvPr/>
-        </p:nvSpPr>
-        <p:spPr>
-          <a:xfrm>
-            <a:off x="2761461" y="1543677"/>
-            <a:ext cx="287723" cy="460993"/>
-          </a:xfrm>
-          <a:prstGeom prst="leftBrace">
-            <a:avLst/>
-          </a:prstGeom>
-        </p:spPr>
-        <p:style>
-          <a:lnRef idx="1">
-            <a:schemeClr val="accent1"/>
-          </a:lnRef>
-          <a:fillRef idx="0">
-            <a:schemeClr val="accent1"/>
-          </a:fillRef>
-          <a:effectRef idx="0">
-            <a:schemeClr val="accent1"/>
-          </a:effectRef>
-          <a:fontRef idx="minor">
-            <a:schemeClr val="tx1"/>
-          </a:fontRef>
-        </p:style>
-        <p:txBody>
-          <a:bodyPr rtlCol="0" anchor="ctr"/>
-          <a:lstStyle/>
-          <a:p>
-            <a:pPr algn="ctr"/>
-            <a:endParaRPr lang="zh-CN" altLang="en-US"/>
-          </a:p>
-        </p:txBody>
-      </p:sp>
-      <p:sp>
-        <p:nvSpPr>
-          <p:cNvPr id="89" name="椭圆 88">
-            <a:extLst>
-              <a:ext uri="{FF2B5EF4-FFF2-40B4-BE49-F238E27FC236}">
-                <a16:creationId xmlns:a16="http://schemas.microsoft.com/office/drawing/2014/main" id="{8EDCD3CB-3022-4238-F917-C058CA89D123}"/>
-              </a:ext>
-            </a:extLst>
-          </p:cNvPr>
-          <p:cNvSpPr/>
-          <p:nvPr/>
-        </p:nvSpPr>
-        <p:spPr>
-          <a:xfrm>
-            <a:off x="2451288" y="1664925"/>
-            <a:ext cx="212335" cy="198746"/>
-          </a:xfrm>
-          <a:prstGeom prst="ellipse">
-            <a:avLst/>
-          </a:prstGeom>
-        </p:spPr>
-        <p:style>
-          <a:lnRef idx="2">
-            <a:schemeClr val="accent1">
-              <a:shade val="15000"/>
-            </a:schemeClr>
-          </a:lnRef>
-          <a:fillRef idx="1">
-            <a:schemeClr val="accent1"/>
-          </a:fillRef>
-          <a:effectRef idx="0">
-            <a:schemeClr val="accent1"/>
-          </a:effectRef>
-          <a:fontRef idx="minor">
-            <a:schemeClr val="lt1"/>
-          </a:fontRef>
-        </p:style>
-        <p:txBody>
-          <a:bodyPr rtlCol="0" anchor="ctr"/>
-          <a:lstStyle/>
-          <a:p>
-            <a:pPr algn="ctr"/>
-            <a:r>
-              <a:rPr lang="en-US" altLang="zh-CN" sz="1200" dirty="0"/>
-              <a:t>1</a:t>
-            </a:r>
-            <a:endParaRPr lang="zh-CN" altLang="en-US" dirty="0"/>
+            <a:endParaRPr lang="zh-CN" altLang="en-US" sz="700" dirty="0"/>
           </a:p>
         </p:txBody>
       </p:sp>
@@ -4965,9 +4801,9 @@
           <p:nvPr/>
         </p:nvCxnSpPr>
         <p:spPr>
-          <a:xfrm>
-            <a:off x="3091757" y="792795"/>
-            <a:ext cx="0" cy="3949430"/>
+          <a:xfrm flipH="1">
+            <a:off x="4451042" y="955633"/>
+            <a:ext cx="6049" cy="3311567"/>
           </a:xfrm>
           <a:prstGeom prst="line">
             <a:avLst/>
@@ -5008,9 +4844,9 @@
           <p:nvPr/>
         </p:nvCxnSpPr>
         <p:spPr>
-          <a:xfrm flipH="1">
-            <a:off x="5648711" y="793618"/>
-            <a:ext cx="7" cy="3949430"/>
+          <a:xfrm>
+            <a:off x="7014052" y="956456"/>
+            <a:ext cx="180" cy="3371704"/>
           </a:xfrm>
           <a:prstGeom prst="line">
             <a:avLst/>
@@ -5050,7 +4886,7 @@
         </p:nvSpPr>
         <p:spPr>
           <a:xfrm>
-            <a:off x="3487224" y="2291867"/>
+            <a:off x="4949655" y="2453177"/>
             <a:ext cx="1643378" cy="200055"/>
           </a:xfrm>
           <a:prstGeom prst="rect">
@@ -5066,7 +4902,7 @@
           <a:p>
             <a:r>
               <a:rPr lang="en-US" altLang="zh-CN" sz="700" b="1" dirty="0"/>
-              <a:t>PATH2 CUID1, Path ID2, Sender Key</a:t>
+              <a:t>CUID1, Path ID2, Sender Key</a:t>
             </a:r>
             <a:endParaRPr lang="zh-CN" altLang="en-US" sz="700" b="1" dirty="0"/>
           </a:p>
@@ -5086,8 +4922,8 @@
         </p:nvSpPr>
         <p:spPr>
           <a:xfrm>
-            <a:off x="5897351" y="2461254"/>
-            <a:ext cx="1702710" cy="200055"/>
+            <a:off x="4948246" y="3057481"/>
+            <a:ext cx="1452642" cy="200055"/>
           </a:xfrm>
           <a:prstGeom prst="rect">
             <a:avLst/>
@@ -5102,7 +4938,2244 @@
           <a:p>
             <a:r>
               <a:rPr lang="en-US" altLang="zh-CN" sz="700" b="1" dirty="0"/>
-              <a:t>PATH1 CUID2, Path ID1, Receiver Key</a:t>
+              <a:t>CUID2, Path ID2, Receiver Key</a:t>
+            </a:r>
+            <a:endParaRPr lang="zh-CN" altLang="en-US" sz="700" b="1" dirty="0"/>
+          </a:p>
+        </p:txBody>
+      </p:sp>
+      <p:cxnSp>
+        <p:nvCxnSpPr>
+          <p:cNvPr id="40" name="直线连接符 39">
+            <a:extLst>
+              <a:ext uri="{FF2B5EF4-FFF2-40B4-BE49-F238E27FC236}">
+                <a16:creationId xmlns:a16="http://schemas.microsoft.com/office/drawing/2014/main" id="{A0A66628-1026-E60E-5F06-428984A08AE6}"/>
+              </a:ext>
+            </a:extLst>
+          </p:cNvPr>
+          <p:cNvCxnSpPr/>
+          <p:nvPr/>
+        </p:nvCxnSpPr>
+        <p:spPr>
+          <a:xfrm>
+            <a:off x="4300151" y="950125"/>
+            <a:ext cx="293836" cy="0"/>
+          </a:xfrm>
+          <a:prstGeom prst="line">
+            <a:avLst/>
+          </a:prstGeom>
+          <a:ln w="19050">
+            <a:solidFill>
+              <a:schemeClr val="tx1"/>
+            </a:solidFill>
+          </a:ln>
+        </p:spPr>
+        <p:style>
+          <a:lnRef idx="1">
+            <a:schemeClr val="accent1"/>
+          </a:lnRef>
+          <a:fillRef idx="0">
+            <a:schemeClr val="accent1"/>
+          </a:fillRef>
+          <a:effectRef idx="0">
+            <a:schemeClr val="accent1"/>
+          </a:effectRef>
+          <a:fontRef idx="minor">
+            <a:schemeClr val="tx1"/>
+          </a:fontRef>
+        </p:style>
+      </p:cxnSp>
+      <p:cxnSp>
+        <p:nvCxnSpPr>
+          <p:cNvPr id="41" name="直线连接符 40">
+            <a:extLst>
+              <a:ext uri="{FF2B5EF4-FFF2-40B4-BE49-F238E27FC236}">
+                <a16:creationId xmlns:a16="http://schemas.microsoft.com/office/drawing/2014/main" id="{051985C7-00BE-95F2-FBFB-1A157493E0A1}"/>
+              </a:ext>
+            </a:extLst>
+          </p:cNvPr>
+          <p:cNvCxnSpPr/>
+          <p:nvPr/>
+        </p:nvCxnSpPr>
+        <p:spPr>
+          <a:xfrm>
+            <a:off x="4662665" y="947975"/>
+            <a:ext cx="293836" cy="0"/>
+          </a:xfrm>
+          <a:prstGeom prst="line">
+            <a:avLst/>
+          </a:prstGeom>
+          <a:ln w="19050">
+            <a:solidFill>
+              <a:schemeClr val="tx1"/>
+            </a:solidFill>
+          </a:ln>
+        </p:spPr>
+        <p:style>
+          <a:lnRef idx="1">
+            <a:schemeClr val="accent1"/>
+          </a:lnRef>
+          <a:fillRef idx="0">
+            <a:schemeClr val="accent1"/>
+          </a:fillRef>
+          <a:effectRef idx="0">
+            <a:schemeClr val="accent1"/>
+          </a:effectRef>
+          <a:fontRef idx="minor">
+            <a:schemeClr val="tx1"/>
+          </a:fontRef>
+        </p:style>
+      </p:cxnSp>
+      <p:cxnSp>
+        <p:nvCxnSpPr>
+          <p:cNvPr id="44" name="直线连接符 43">
+            <a:extLst>
+              <a:ext uri="{FF2B5EF4-FFF2-40B4-BE49-F238E27FC236}">
+                <a16:creationId xmlns:a16="http://schemas.microsoft.com/office/drawing/2014/main" id="{4601F24F-DF96-7327-AEB7-E8489CEB97DC}"/>
+              </a:ext>
+            </a:extLst>
+          </p:cNvPr>
+          <p:cNvCxnSpPr/>
+          <p:nvPr/>
+        </p:nvCxnSpPr>
+        <p:spPr>
+          <a:xfrm>
+            <a:off x="6512460" y="950125"/>
+            <a:ext cx="293836" cy="0"/>
+          </a:xfrm>
+          <a:prstGeom prst="line">
+            <a:avLst/>
+          </a:prstGeom>
+          <a:ln w="19050">
+            <a:solidFill>
+              <a:schemeClr val="tx1"/>
+            </a:solidFill>
+          </a:ln>
+        </p:spPr>
+        <p:style>
+          <a:lnRef idx="1">
+            <a:schemeClr val="accent1"/>
+          </a:lnRef>
+          <a:fillRef idx="0">
+            <a:schemeClr val="accent1"/>
+          </a:fillRef>
+          <a:effectRef idx="0">
+            <a:schemeClr val="accent1"/>
+          </a:effectRef>
+          <a:fontRef idx="minor">
+            <a:schemeClr val="tx1"/>
+          </a:fontRef>
+        </p:style>
+      </p:cxnSp>
+      <p:cxnSp>
+        <p:nvCxnSpPr>
+          <p:cNvPr id="45" name="直线连接符 44">
+            <a:extLst>
+              <a:ext uri="{FF2B5EF4-FFF2-40B4-BE49-F238E27FC236}">
+                <a16:creationId xmlns:a16="http://schemas.microsoft.com/office/drawing/2014/main" id="{072D4377-12B8-5FE0-DA00-A6932BCF0409}"/>
+              </a:ext>
+            </a:extLst>
+          </p:cNvPr>
+          <p:cNvCxnSpPr/>
+          <p:nvPr/>
+        </p:nvCxnSpPr>
+        <p:spPr>
+          <a:xfrm>
+            <a:off x="6867127" y="950963"/>
+            <a:ext cx="293836" cy="0"/>
+          </a:xfrm>
+          <a:prstGeom prst="line">
+            <a:avLst/>
+          </a:prstGeom>
+          <a:ln w="19050">
+            <a:solidFill>
+              <a:schemeClr val="tx1"/>
+            </a:solidFill>
+          </a:ln>
+        </p:spPr>
+        <p:style>
+          <a:lnRef idx="1">
+            <a:schemeClr val="accent1"/>
+          </a:lnRef>
+          <a:fillRef idx="0">
+            <a:schemeClr val="accent1"/>
+          </a:fillRef>
+          <a:effectRef idx="0">
+            <a:schemeClr val="accent1"/>
+          </a:effectRef>
+          <a:fontRef idx="minor">
+            <a:schemeClr val="tx1"/>
+          </a:fontRef>
+        </p:style>
+      </p:cxnSp>
+      <p:sp>
+        <p:nvSpPr>
+          <p:cNvPr id="46" name="文本框 45">
+            <a:extLst>
+              <a:ext uri="{FF2B5EF4-FFF2-40B4-BE49-F238E27FC236}">
+                <a16:creationId xmlns:a16="http://schemas.microsoft.com/office/drawing/2014/main" id="{A88357E2-98D8-CA37-8B68-6CFB3878DFF4}"/>
+              </a:ext>
+            </a:extLst>
+          </p:cNvPr>
+          <p:cNvSpPr txBox="1"/>
+          <p:nvPr/>
+        </p:nvSpPr>
+        <p:spPr>
+          <a:xfrm>
+            <a:off x="4180351" y="768849"/>
+            <a:ext cx="548548" cy="200055"/>
+          </a:xfrm>
+          <a:prstGeom prst="rect">
+            <a:avLst/>
+          </a:prstGeom>
+          <a:noFill/>
+        </p:spPr>
+        <p:txBody>
+          <a:bodyPr wrap="none" rtlCol="0">
+            <a:spAutoFit/>
+          </a:bodyPr>
+          <a:lstStyle/>
+          <a:p>
+            <a:r>
+              <a:rPr kumimoji="1" lang="en-US" altLang="zh-CN" sz="700" b="1" dirty="0"/>
+              <a:t>address1</a:t>
+            </a:r>
+            <a:endParaRPr kumimoji="1" lang="zh-CN" altLang="en-US" sz="700" b="1" dirty="0"/>
+          </a:p>
+        </p:txBody>
+      </p:sp>
+      <p:sp>
+        <p:nvSpPr>
+          <p:cNvPr id="47" name="文本框 46">
+            <a:extLst>
+              <a:ext uri="{FF2B5EF4-FFF2-40B4-BE49-F238E27FC236}">
+                <a16:creationId xmlns:a16="http://schemas.microsoft.com/office/drawing/2014/main" id="{F5640507-9590-BEDE-0E9A-F4484A7C962C}"/>
+              </a:ext>
+            </a:extLst>
+          </p:cNvPr>
+          <p:cNvSpPr txBox="1"/>
+          <p:nvPr/>
+        </p:nvSpPr>
+        <p:spPr>
+          <a:xfrm>
+            <a:off x="4570365" y="774517"/>
+            <a:ext cx="548548" cy="200055"/>
+          </a:xfrm>
+          <a:prstGeom prst="rect">
+            <a:avLst/>
+          </a:prstGeom>
+          <a:noFill/>
+        </p:spPr>
+        <p:txBody>
+          <a:bodyPr wrap="none" rtlCol="0">
+            <a:spAutoFit/>
+          </a:bodyPr>
+          <a:lstStyle/>
+          <a:p>
+            <a:r>
+              <a:rPr kumimoji="1" lang="en-US" altLang="zh-CN" sz="700" b="1" dirty="0"/>
+              <a:t>address2</a:t>
+            </a:r>
+            <a:endParaRPr kumimoji="1" lang="zh-CN" altLang="en-US" sz="700" b="1" dirty="0"/>
+          </a:p>
+        </p:txBody>
+      </p:sp>
+      <p:sp>
+        <p:nvSpPr>
+          <p:cNvPr id="49" name="文本框 48">
+            <a:extLst>
+              <a:ext uri="{FF2B5EF4-FFF2-40B4-BE49-F238E27FC236}">
+                <a16:creationId xmlns:a16="http://schemas.microsoft.com/office/drawing/2014/main" id="{EF4B43E7-C9A6-9C39-DFD5-EB0AF11F8DDA}"/>
+              </a:ext>
+            </a:extLst>
+          </p:cNvPr>
+          <p:cNvSpPr txBox="1"/>
+          <p:nvPr/>
+        </p:nvSpPr>
+        <p:spPr>
+          <a:xfrm>
+            <a:off x="6385104" y="783195"/>
+            <a:ext cx="548548" cy="200055"/>
+          </a:xfrm>
+          <a:prstGeom prst="rect">
+            <a:avLst/>
+          </a:prstGeom>
+          <a:noFill/>
+        </p:spPr>
+        <p:txBody>
+          <a:bodyPr wrap="none" rtlCol="0">
+            <a:spAutoFit/>
+          </a:bodyPr>
+          <a:lstStyle/>
+          <a:p>
+            <a:r>
+              <a:rPr kumimoji="1" lang="en-US" altLang="zh-CN" sz="700" b="1" dirty="0"/>
+              <a:t>address1</a:t>
+            </a:r>
+            <a:endParaRPr kumimoji="1" lang="zh-CN" altLang="en-US" sz="700" b="1" dirty="0"/>
+          </a:p>
+        </p:txBody>
+      </p:sp>
+      <p:sp>
+        <p:nvSpPr>
+          <p:cNvPr id="53" name="文本框 52">
+            <a:extLst>
+              <a:ext uri="{FF2B5EF4-FFF2-40B4-BE49-F238E27FC236}">
+                <a16:creationId xmlns:a16="http://schemas.microsoft.com/office/drawing/2014/main" id="{8E7161B8-06E0-E842-2AD8-B3A11C743C2E}"/>
+              </a:ext>
+            </a:extLst>
+          </p:cNvPr>
+          <p:cNvSpPr txBox="1"/>
+          <p:nvPr/>
+        </p:nvSpPr>
+        <p:spPr>
+          <a:xfrm>
+            <a:off x="6779481" y="788702"/>
+            <a:ext cx="548548" cy="200055"/>
+          </a:xfrm>
+          <a:prstGeom prst="rect">
+            <a:avLst/>
+          </a:prstGeom>
+          <a:noFill/>
+        </p:spPr>
+        <p:txBody>
+          <a:bodyPr wrap="none" rtlCol="0">
+            <a:spAutoFit/>
+          </a:bodyPr>
+          <a:lstStyle/>
+          <a:p>
+            <a:r>
+              <a:rPr kumimoji="1" lang="en-US" altLang="zh-CN" sz="700" b="1" dirty="0"/>
+              <a:t>address2</a:t>
+            </a:r>
+            <a:endParaRPr kumimoji="1" lang="zh-CN" altLang="en-US" sz="700" b="1" dirty="0"/>
+          </a:p>
+        </p:txBody>
+      </p:sp>
+      <p:sp>
+        <p:nvSpPr>
+          <p:cNvPr id="54" name="文本框 53">
+            <a:extLst>
+              <a:ext uri="{FF2B5EF4-FFF2-40B4-BE49-F238E27FC236}">
+                <a16:creationId xmlns:a16="http://schemas.microsoft.com/office/drawing/2014/main" id="{334FBDD8-489E-9AC9-09EA-989D501E63D1}"/>
+              </a:ext>
+            </a:extLst>
+          </p:cNvPr>
+          <p:cNvSpPr txBox="1"/>
+          <p:nvPr/>
+        </p:nvSpPr>
+        <p:spPr>
+          <a:xfrm>
+            <a:off x="4284997" y="583809"/>
+            <a:ext cx="755335" cy="215444"/>
+          </a:xfrm>
+          <a:prstGeom prst="rect">
+            <a:avLst/>
+          </a:prstGeom>
+          <a:noFill/>
+        </p:spPr>
+        <p:txBody>
+          <a:bodyPr wrap="none" rtlCol="0">
+            <a:spAutoFit/>
+          </a:bodyPr>
+          <a:lstStyle/>
+          <a:p>
+            <a:r>
+              <a:rPr kumimoji="1" lang="en-US" altLang="zh-CN" sz="800" b="1" dirty="0"/>
+              <a:t>Cybertwin A</a:t>
+            </a:r>
+            <a:endParaRPr kumimoji="1" lang="zh-CN" altLang="en-US" sz="800" b="1" dirty="0"/>
+          </a:p>
+        </p:txBody>
+      </p:sp>
+      <p:sp>
+        <p:nvSpPr>
+          <p:cNvPr id="55" name="文本框 54">
+            <a:extLst>
+              <a:ext uri="{FF2B5EF4-FFF2-40B4-BE49-F238E27FC236}">
+                <a16:creationId xmlns:a16="http://schemas.microsoft.com/office/drawing/2014/main" id="{2BCA56EF-60FA-0C0A-8C5E-0028E853C8A1}"/>
+              </a:ext>
+            </a:extLst>
+          </p:cNvPr>
+          <p:cNvSpPr txBox="1"/>
+          <p:nvPr/>
+        </p:nvSpPr>
+        <p:spPr>
+          <a:xfrm>
+            <a:off x="6445691" y="597671"/>
+            <a:ext cx="748923" cy="215444"/>
+          </a:xfrm>
+          <a:prstGeom prst="rect">
+            <a:avLst/>
+          </a:prstGeom>
+          <a:noFill/>
+        </p:spPr>
+        <p:txBody>
+          <a:bodyPr wrap="none" rtlCol="0">
+            <a:spAutoFit/>
+          </a:bodyPr>
+          <a:lstStyle/>
+          <a:p>
+            <a:r>
+              <a:rPr kumimoji="1" lang="en-US" altLang="zh-CN" sz="800" b="1" dirty="0"/>
+              <a:t>Cybertwin B</a:t>
+            </a:r>
+            <a:endParaRPr kumimoji="1" lang="zh-CN" altLang="en-US" sz="800" b="1" dirty="0"/>
+          </a:p>
+        </p:txBody>
+      </p:sp>
+      <p:cxnSp>
+        <p:nvCxnSpPr>
+          <p:cNvPr id="61" name="直线连接符 60">
+            <a:extLst>
+              <a:ext uri="{FF2B5EF4-FFF2-40B4-BE49-F238E27FC236}">
+                <a16:creationId xmlns:a16="http://schemas.microsoft.com/office/drawing/2014/main" id="{D965EECA-E599-91BF-934D-E48444BF784B}"/>
+              </a:ext>
+            </a:extLst>
+          </p:cNvPr>
+          <p:cNvCxnSpPr>
+            <a:cxnSpLocks/>
+          </p:cNvCxnSpPr>
+          <p:nvPr/>
+        </p:nvCxnSpPr>
+        <p:spPr>
+          <a:xfrm>
+            <a:off x="3946668" y="2069667"/>
+            <a:ext cx="3292888" cy="21616"/>
+          </a:xfrm>
+          <a:prstGeom prst="line">
+            <a:avLst/>
+          </a:prstGeom>
+          <a:ln w="12700">
+            <a:solidFill>
+              <a:schemeClr val="tx1">
+                <a:lumMod val="85000"/>
+                <a:lumOff val="15000"/>
+              </a:schemeClr>
+            </a:solidFill>
+            <a:prstDash val="dashDot"/>
+          </a:ln>
+        </p:spPr>
+        <p:style>
+          <a:lnRef idx="1">
+            <a:schemeClr val="accent1"/>
+          </a:lnRef>
+          <a:fillRef idx="0">
+            <a:schemeClr val="accent1"/>
+          </a:fillRef>
+          <a:effectRef idx="0">
+            <a:schemeClr val="accent1"/>
+          </a:effectRef>
+          <a:fontRef idx="minor">
+            <a:schemeClr val="tx1"/>
+          </a:fontRef>
+        </p:style>
+      </p:cxnSp>
+      <p:cxnSp>
+        <p:nvCxnSpPr>
+          <p:cNvPr id="62" name="直线连接符 61">
+            <a:extLst>
+              <a:ext uri="{FF2B5EF4-FFF2-40B4-BE49-F238E27FC236}">
+                <a16:creationId xmlns:a16="http://schemas.microsoft.com/office/drawing/2014/main" id="{F09EFB63-384D-F340-9445-34E6F7EA3868}"/>
+              </a:ext>
+            </a:extLst>
+          </p:cNvPr>
+          <p:cNvCxnSpPr>
+            <a:cxnSpLocks/>
+          </p:cNvCxnSpPr>
+          <p:nvPr/>
+        </p:nvCxnSpPr>
+        <p:spPr>
+          <a:xfrm>
+            <a:off x="3946668" y="1116797"/>
+            <a:ext cx="3292887" cy="0"/>
+          </a:xfrm>
+          <a:prstGeom prst="line">
+            <a:avLst/>
+          </a:prstGeom>
+          <a:ln w="12700">
+            <a:solidFill>
+              <a:schemeClr val="tx1">
+                <a:lumMod val="85000"/>
+                <a:lumOff val="15000"/>
+              </a:schemeClr>
+            </a:solidFill>
+            <a:prstDash val="dashDot"/>
+          </a:ln>
+        </p:spPr>
+        <p:style>
+          <a:lnRef idx="1">
+            <a:schemeClr val="accent1"/>
+          </a:lnRef>
+          <a:fillRef idx="0">
+            <a:schemeClr val="accent1"/>
+          </a:fillRef>
+          <a:effectRef idx="0">
+            <a:schemeClr val="accent1"/>
+          </a:effectRef>
+          <a:fontRef idx="minor">
+            <a:schemeClr val="tx1"/>
+          </a:fontRef>
+        </p:style>
+      </p:cxnSp>
+      <p:sp>
+        <p:nvSpPr>
+          <p:cNvPr id="79" name="文本框 78">
+            <a:extLst>
+              <a:ext uri="{FF2B5EF4-FFF2-40B4-BE49-F238E27FC236}">
+                <a16:creationId xmlns:a16="http://schemas.microsoft.com/office/drawing/2014/main" id="{339DAACD-AC57-4B79-3BEC-FEF509E08120}"/>
+              </a:ext>
+            </a:extLst>
+          </p:cNvPr>
+          <p:cNvSpPr txBox="1"/>
+          <p:nvPr/>
+        </p:nvSpPr>
+        <p:spPr>
+          <a:xfrm>
+            <a:off x="3923964" y="1216824"/>
+            <a:ext cx="292388" cy="727122"/>
+          </a:xfrm>
+          <a:prstGeom prst="rect">
+            <a:avLst/>
+          </a:prstGeom>
+          <a:noFill/>
+        </p:spPr>
+        <p:txBody>
+          <a:bodyPr vert="eaVert" wrap="none" rtlCol="0">
+            <a:spAutoFit/>
+          </a:bodyPr>
+          <a:lstStyle/>
+          <a:p>
+            <a:r>
+              <a:rPr kumimoji="1" lang="en-US" altLang="zh-CN" sz="700" b="1" dirty="0"/>
+              <a:t>TCP Handshake</a:t>
+            </a:r>
+            <a:endParaRPr kumimoji="1" lang="zh-CN" altLang="en-US" sz="700" b="1" dirty="0"/>
+          </a:p>
+        </p:txBody>
+      </p:sp>
+      <p:cxnSp>
+        <p:nvCxnSpPr>
+          <p:cNvPr id="91" name="直接箭头连接符 63">
+            <a:extLst>
+              <a:ext uri="{FF2B5EF4-FFF2-40B4-BE49-F238E27FC236}">
+                <a16:creationId xmlns:a16="http://schemas.microsoft.com/office/drawing/2014/main" id="{47961B9F-8841-8EE7-1F40-E793D476BF0E}"/>
+              </a:ext>
+            </a:extLst>
+          </p:cNvPr>
+          <p:cNvCxnSpPr>
+            <a:cxnSpLocks/>
+          </p:cNvCxnSpPr>
+          <p:nvPr/>
+        </p:nvCxnSpPr>
+        <p:spPr>
+          <a:xfrm>
+            <a:off x="4832019" y="3645283"/>
+            <a:ext cx="2160804" cy="130287"/>
+          </a:xfrm>
+          <a:prstGeom prst="straightConnector1">
+            <a:avLst/>
+          </a:prstGeom>
+          <a:ln>
+            <a:tailEnd type="triangle"/>
+          </a:ln>
+        </p:spPr>
+        <p:style>
+          <a:lnRef idx="1">
+            <a:schemeClr val="accent1"/>
+          </a:lnRef>
+          <a:fillRef idx="0">
+            <a:schemeClr val="accent1"/>
+          </a:fillRef>
+          <a:effectRef idx="0">
+            <a:schemeClr val="accent1"/>
+          </a:effectRef>
+          <a:fontRef idx="minor">
+            <a:schemeClr val="tx1"/>
+          </a:fontRef>
+        </p:style>
+      </p:cxnSp>
+      <p:cxnSp>
+        <p:nvCxnSpPr>
+          <p:cNvPr id="97" name="直线连接符 96">
+            <a:extLst>
+              <a:ext uri="{FF2B5EF4-FFF2-40B4-BE49-F238E27FC236}">
+                <a16:creationId xmlns:a16="http://schemas.microsoft.com/office/drawing/2014/main" id="{43FCC99F-30CB-B754-56F6-40EDE65A0D1B}"/>
+              </a:ext>
+            </a:extLst>
+          </p:cNvPr>
+          <p:cNvCxnSpPr>
+            <a:cxnSpLocks/>
+          </p:cNvCxnSpPr>
+          <p:nvPr/>
+        </p:nvCxnSpPr>
+        <p:spPr>
+          <a:xfrm>
+            <a:off x="3946668" y="4018051"/>
+            <a:ext cx="3292888" cy="21616"/>
+          </a:xfrm>
+          <a:prstGeom prst="line">
+            <a:avLst/>
+          </a:prstGeom>
+          <a:ln w="12700">
+            <a:solidFill>
+              <a:schemeClr val="tx1">
+                <a:lumMod val="85000"/>
+                <a:lumOff val="15000"/>
+              </a:schemeClr>
+            </a:solidFill>
+            <a:prstDash val="dashDot"/>
+          </a:ln>
+        </p:spPr>
+        <p:style>
+          <a:lnRef idx="1">
+            <a:schemeClr val="accent1"/>
+          </a:lnRef>
+          <a:fillRef idx="0">
+            <a:schemeClr val="accent1"/>
+          </a:fillRef>
+          <a:effectRef idx="0">
+            <a:schemeClr val="accent1"/>
+          </a:effectRef>
+          <a:fontRef idx="minor">
+            <a:schemeClr val="tx1"/>
+          </a:fontRef>
+        </p:style>
+      </p:cxnSp>
+      <p:sp>
+        <p:nvSpPr>
+          <p:cNvPr id="99" name="文本框 98">
+            <a:extLst>
+              <a:ext uri="{FF2B5EF4-FFF2-40B4-BE49-F238E27FC236}">
+                <a16:creationId xmlns:a16="http://schemas.microsoft.com/office/drawing/2014/main" id="{9AE4E349-5220-678B-720F-EE88566D9124}"/>
+              </a:ext>
+            </a:extLst>
+          </p:cNvPr>
+          <p:cNvSpPr txBox="1"/>
+          <p:nvPr/>
+        </p:nvSpPr>
+        <p:spPr>
+          <a:xfrm>
+            <a:off x="3910376" y="2309844"/>
+            <a:ext cx="292388" cy="1613583"/>
+          </a:xfrm>
+          <a:prstGeom prst="rect">
+            <a:avLst/>
+          </a:prstGeom>
+          <a:noFill/>
+        </p:spPr>
+        <p:txBody>
+          <a:bodyPr vert="eaVert" wrap="none" rtlCol="0">
+            <a:spAutoFit/>
+          </a:bodyPr>
+          <a:lstStyle/>
+          <a:p>
+            <a:r>
+              <a:rPr kumimoji="1" lang="en-US" altLang="zh-CN" sz="700" b="1" dirty="0"/>
+              <a:t>MDTP Handshake (path aggregation)</a:t>
+            </a:r>
+            <a:endParaRPr kumimoji="1" lang="zh-CN" altLang="en-US" sz="700" b="1" dirty="0"/>
+          </a:p>
+        </p:txBody>
+      </p:sp>
+      <p:sp>
+        <p:nvSpPr>
+          <p:cNvPr id="109" name="文本框 108">
+            <a:extLst>
+              <a:ext uri="{FF2B5EF4-FFF2-40B4-BE49-F238E27FC236}">
+                <a16:creationId xmlns:a16="http://schemas.microsoft.com/office/drawing/2014/main" id="{B96B05C0-168A-BC62-5772-EA7F89ED86F5}"/>
+              </a:ext>
+            </a:extLst>
+          </p:cNvPr>
+          <p:cNvSpPr txBox="1"/>
+          <p:nvPr/>
+        </p:nvSpPr>
+        <p:spPr>
+          <a:xfrm>
+            <a:off x="4954607" y="3568668"/>
+            <a:ext cx="1250663" cy="307777"/>
+          </a:xfrm>
+          <a:prstGeom prst="rect">
+            <a:avLst/>
+          </a:prstGeom>
+          <a:noFill/>
+        </p:spPr>
+        <p:txBody>
+          <a:bodyPr wrap="none" rtlCol="0">
+            <a:spAutoFit/>
+          </a:bodyPr>
+          <a:lstStyle/>
+          <a:p>
+            <a:r>
+              <a:rPr lang="en-US" altLang="zh-CN" sz="700" b="1" dirty="0"/>
+              <a:t>Path1, Conn ID, Data Seq </a:t>
+            </a:r>
+          </a:p>
+          <a:p>
+            <a:endParaRPr lang="zh-CN" altLang="en-US" sz="700" dirty="0"/>
+          </a:p>
+        </p:txBody>
+      </p:sp>
+      <p:cxnSp>
+        <p:nvCxnSpPr>
+          <p:cNvPr id="120" name="直接连接符 2">
+            <a:extLst>
+              <a:ext uri="{FF2B5EF4-FFF2-40B4-BE49-F238E27FC236}">
+                <a16:creationId xmlns:a16="http://schemas.microsoft.com/office/drawing/2014/main" id="{A3534A1B-E2FC-C969-F5CB-A903F24A0E2E}"/>
+              </a:ext>
+            </a:extLst>
+          </p:cNvPr>
+          <p:cNvCxnSpPr>
+            <a:cxnSpLocks/>
+          </p:cNvCxnSpPr>
+          <p:nvPr/>
+        </p:nvCxnSpPr>
+        <p:spPr>
+          <a:xfrm flipH="1">
+            <a:off x="8829079" y="972110"/>
+            <a:ext cx="19575" cy="3325572"/>
+          </a:xfrm>
+          <a:prstGeom prst="line">
+            <a:avLst/>
+          </a:prstGeom>
+          <a:ln w="19050">
+            <a:solidFill>
+              <a:schemeClr val="tx1"/>
+            </a:solidFill>
+          </a:ln>
+        </p:spPr>
+        <p:style>
+          <a:lnRef idx="1">
+            <a:schemeClr val="accent1"/>
+          </a:lnRef>
+          <a:fillRef idx="0">
+            <a:schemeClr val="accent1"/>
+          </a:fillRef>
+          <a:effectRef idx="0">
+            <a:schemeClr val="accent1"/>
+          </a:effectRef>
+          <a:fontRef idx="minor">
+            <a:schemeClr val="tx1"/>
+          </a:fontRef>
+        </p:style>
+      </p:cxnSp>
+      <p:cxnSp>
+        <p:nvCxnSpPr>
+          <p:cNvPr id="121" name="直接连接符 47">
+            <a:extLst>
+              <a:ext uri="{FF2B5EF4-FFF2-40B4-BE49-F238E27FC236}">
+                <a16:creationId xmlns:a16="http://schemas.microsoft.com/office/drawing/2014/main" id="{84CE8C3E-AD9A-B85D-05E4-C7969D0515DC}"/>
+              </a:ext>
+            </a:extLst>
+          </p:cNvPr>
+          <p:cNvCxnSpPr>
+            <a:cxnSpLocks/>
+          </p:cNvCxnSpPr>
+          <p:nvPr/>
+        </p:nvCxnSpPr>
+        <p:spPr>
+          <a:xfrm>
+            <a:off x="10708214" y="986115"/>
+            <a:ext cx="7066" cy="3372527"/>
+          </a:xfrm>
+          <a:prstGeom prst="line">
+            <a:avLst/>
+          </a:prstGeom>
+          <a:ln w="19050">
+            <a:solidFill>
+              <a:schemeClr val="tx1"/>
+            </a:solidFill>
+          </a:ln>
+        </p:spPr>
+        <p:style>
+          <a:lnRef idx="1">
+            <a:schemeClr val="accent1"/>
+          </a:lnRef>
+          <a:fillRef idx="0">
+            <a:schemeClr val="accent1"/>
+          </a:fillRef>
+          <a:effectRef idx="0">
+            <a:schemeClr val="accent1"/>
+          </a:effectRef>
+          <a:fontRef idx="minor">
+            <a:schemeClr val="tx1"/>
+          </a:fontRef>
+        </p:style>
+      </p:cxnSp>
+      <p:cxnSp>
+        <p:nvCxnSpPr>
+          <p:cNvPr id="138" name="直接连接符 2">
+            <a:extLst>
+              <a:ext uri="{FF2B5EF4-FFF2-40B4-BE49-F238E27FC236}">
+                <a16:creationId xmlns:a16="http://schemas.microsoft.com/office/drawing/2014/main" id="{1E079BC0-F4FB-154E-C375-12A72397D146}"/>
+              </a:ext>
+            </a:extLst>
+          </p:cNvPr>
+          <p:cNvCxnSpPr>
+            <a:cxnSpLocks/>
+          </p:cNvCxnSpPr>
+          <p:nvPr/>
+        </p:nvCxnSpPr>
+        <p:spPr>
+          <a:xfrm flipH="1">
+            <a:off x="8485643" y="986115"/>
+            <a:ext cx="6049" cy="3311567"/>
+          </a:xfrm>
+          <a:prstGeom prst="line">
+            <a:avLst/>
+          </a:prstGeom>
+          <a:ln w="19050">
+            <a:solidFill>
+              <a:schemeClr val="tx1"/>
+            </a:solidFill>
+          </a:ln>
+        </p:spPr>
+        <p:style>
+          <a:lnRef idx="1">
+            <a:schemeClr val="accent1"/>
+          </a:lnRef>
+          <a:fillRef idx="0">
+            <a:schemeClr val="accent1"/>
+          </a:fillRef>
+          <a:effectRef idx="0">
+            <a:schemeClr val="accent1"/>
+          </a:effectRef>
+          <a:fontRef idx="minor">
+            <a:schemeClr val="tx1"/>
+          </a:fontRef>
+        </p:style>
+      </p:cxnSp>
+      <p:cxnSp>
+        <p:nvCxnSpPr>
+          <p:cNvPr id="139" name="直接连接符 47">
+            <a:extLst>
+              <a:ext uri="{FF2B5EF4-FFF2-40B4-BE49-F238E27FC236}">
+                <a16:creationId xmlns:a16="http://schemas.microsoft.com/office/drawing/2014/main" id="{371979C3-459C-1F0E-0AA0-8F7A8E2838EA}"/>
+              </a:ext>
+            </a:extLst>
+          </p:cNvPr>
+          <p:cNvCxnSpPr>
+            <a:cxnSpLocks/>
+          </p:cNvCxnSpPr>
+          <p:nvPr/>
+        </p:nvCxnSpPr>
+        <p:spPr>
+          <a:xfrm>
+            <a:off x="11048653" y="986938"/>
+            <a:ext cx="180" cy="3371704"/>
+          </a:xfrm>
+          <a:prstGeom prst="line">
+            <a:avLst/>
+          </a:prstGeom>
+          <a:ln w="19050">
+            <a:solidFill>
+              <a:schemeClr val="tx1"/>
+            </a:solidFill>
+          </a:ln>
+        </p:spPr>
+        <p:style>
+          <a:lnRef idx="1">
+            <a:schemeClr val="accent1"/>
+          </a:lnRef>
+          <a:fillRef idx="0">
+            <a:schemeClr val="accent1"/>
+          </a:fillRef>
+          <a:effectRef idx="0">
+            <a:schemeClr val="accent1"/>
+          </a:effectRef>
+          <a:fontRef idx="minor">
+            <a:schemeClr val="tx1"/>
+          </a:fontRef>
+        </p:style>
+      </p:cxnSp>
+      <p:cxnSp>
+        <p:nvCxnSpPr>
+          <p:cNvPr id="142" name="直线连接符 141">
+            <a:extLst>
+              <a:ext uri="{FF2B5EF4-FFF2-40B4-BE49-F238E27FC236}">
+                <a16:creationId xmlns:a16="http://schemas.microsoft.com/office/drawing/2014/main" id="{FFA1AD02-E96C-3417-F32C-D59337C13B00}"/>
+              </a:ext>
+            </a:extLst>
+          </p:cNvPr>
+          <p:cNvCxnSpPr/>
+          <p:nvPr/>
+        </p:nvCxnSpPr>
+        <p:spPr>
+          <a:xfrm>
+            <a:off x="8334752" y="980607"/>
+            <a:ext cx="293836" cy="0"/>
+          </a:xfrm>
+          <a:prstGeom prst="line">
+            <a:avLst/>
+          </a:prstGeom>
+          <a:ln w="19050">
+            <a:solidFill>
+              <a:schemeClr val="tx1"/>
+            </a:solidFill>
+          </a:ln>
+        </p:spPr>
+        <p:style>
+          <a:lnRef idx="1">
+            <a:schemeClr val="accent1"/>
+          </a:lnRef>
+          <a:fillRef idx="0">
+            <a:schemeClr val="accent1"/>
+          </a:fillRef>
+          <a:effectRef idx="0">
+            <a:schemeClr val="accent1"/>
+          </a:effectRef>
+          <a:fontRef idx="minor">
+            <a:schemeClr val="tx1"/>
+          </a:fontRef>
+        </p:style>
+      </p:cxnSp>
+      <p:cxnSp>
+        <p:nvCxnSpPr>
+          <p:cNvPr id="143" name="直线连接符 142">
+            <a:extLst>
+              <a:ext uri="{FF2B5EF4-FFF2-40B4-BE49-F238E27FC236}">
+                <a16:creationId xmlns:a16="http://schemas.microsoft.com/office/drawing/2014/main" id="{AC129543-EEBF-EE59-6CAE-762E023E3312}"/>
+              </a:ext>
+            </a:extLst>
+          </p:cNvPr>
+          <p:cNvCxnSpPr/>
+          <p:nvPr/>
+        </p:nvCxnSpPr>
+        <p:spPr>
+          <a:xfrm>
+            <a:off x="8697266" y="978457"/>
+            <a:ext cx="293836" cy="0"/>
+          </a:xfrm>
+          <a:prstGeom prst="line">
+            <a:avLst/>
+          </a:prstGeom>
+          <a:ln w="19050">
+            <a:solidFill>
+              <a:schemeClr val="tx1"/>
+            </a:solidFill>
+          </a:ln>
+        </p:spPr>
+        <p:style>
+          <a:lnRef idx="1">
+            <a:schemeClr val="accent1"/>
+          </a:lnRef>
+          <a:fillRef idx="0">
+            <a:schemeClr val="accent1"/>
+          </a:fillRef>
+          <a:effectRef idx="0">
+            <a:schemeClr val="accent1"/>
+          </a:effectRef>
+          <a:fontRef idx="minor">
+            <a:schemeClr val="tx1"/>
+          </a:fontRef>
+        </p:style>
+      </p:cxnSp>
+      <p:cxnSp>
+        <p:nvCxnSpPr>
+          <p:cNvPr id="144" name="直线连接符 143">
+            <a:extLst>
+              <a:ext uri="{FF2B5EF4-FFF2-40B4-BE49-F238E27FC236}">
+                <a16:creationId xmlns:a16="http://schemas.microsoft.com/office/drawing/2014/main" id="{BED8ED29-2C28-C83F-2791-320696E29E9A}"/>
+              </a:ext>
+            </a:extLst>
+          </p:cNvPr>
+          <p:cNvCxnSpPr/>
+          <p:nvPr/>
+        </p:nvCxnSpPr>
+        <p:spPr>
+          <a:xfrm>
+            <a:off x="10547061" y="980607"/>
+            <a:ext cx="293836" cy="0"/>
+          </a:xfrm>
+          <a:prstGeom prst="line">
+            <a:avLst/>
+          </a:prstGeom>
+          <a:ln w="19050">
+            <a:solidFill>
+              <a:schemeClr val="tx1"/>
+            </a:solidFill>
+          </a:ln>
+        </p:spPr>
+        <p:style>
+          <a:lnRef idx="1">
+            <a:schemeClr val="accent1"/>
+          </a:lnRef>
+          <a:fillRef idx="0">
+            <a:schemeClr val="accent1"/>
+          </a:fillRef>
+          <a:effectRef idx="0">
+            <a:schemeClr val="accent1"/>
+          </a:effectRef>
+          <a:fontRef idx="minor">
+            <a:schemeClr val="tx1"/>
+          </a:fontRef>
+        </p:style>
+      </p:cxnSp>
+      <p:cxnSp>
+        <p:nvCxnSpPr>
+          <p:cNvPr id="145" name="直线连接符 144">
+            <a:extLst>
+              <a:ext uri="{FF2B5EF4-FFF2-40B4-BE49-F238E27FC236}">
+                <a16:creationId xmlns:a16="http://schemas.microsoft.com/office/drawing/2014/main" id="{793BBE7A-55A6-CAFD-3760-E9602E78F26E}"/>
+              </a:ext>
+            </a:extLst>
+          </p:cNvPr>
+          <p:cNvCxnSpPr/>
+          <p:nvPr/>
+        </p:nvCxnSpPr>
+        <p:spPr>
+          <a:xfrm>
+            <a:off x="10901728" y="981445"/>
+            <a:ext cx="293836" cy="0"/>
+          </a:xfrm>
+          <a:prstGeom prst="line">
+            <a:avLst/>
+          </a:prstGeom>
+          <a:ln w="19050">
+            <a:solidFill>
+              <a:schemeClr val="tx1"/>
+            </a:solidFill>
+          </a:ln>
+        </p:spPr>
+        <p:style>
+          <a:lnRef idx="1">
+            <a:schemeClr val="accent1"/>
+          </a:lnRef>
+          <a:fillRef idx="0">
+            <a:schemeClr val="accent1"/>
+          </a:fillRef>
+          <a:effectRef idx="0">
+            <a:schemeClr val="accent1"/>
+          </a:effectRef>
+          <a:fontRef idx="minor">
+            <a:schemeClr val="tx1"/>
+          </a:fontRef>
+        </p:style>
+      </p:cxnSp>
+      <p:sp>
+        <p:nvSpPr>
+          <p:cNvPr id="146" name="文本框 145">
+            <a:extLst>
+              <a:ext uri="{FF2B5EF4-FFF2-40B4-BE49-F238E27FC236}">
+                <a16:creationId xmlns:a16="http://schemas.microsoft.com/office/drawing/2014/main" id="{B357E631-2FE7-995C-5F1D-766CBB4A18F4}"/>
+              </a:ext>
+            </a:extLst>
+          </p:cNvPr>
+          <p:cNvSpPr txBox="1"/>
+          <p:nvPr/>
+        </p:nvSpPr>
+        <p:spPr>
+          <a:xfrm>
+            <a:off x="8214952" y="799331"/>
+            <a:ext cx="548548" cy="200055"/>
+          </a:xfrm>
+          <a:prstGeom prst="rect">
+            <a:avLst/>
+          </a:prstGeom>
+          <a:noFill/>
+        </p:spPr>
+        <p:txBody>
+          <a:bodyPr wrap="none" rtlCol="0">
+            <a:spAutoFit/>
+          </a:bodyPr>
+          <a:lstStyle/>
+          <a:p>
+            <a:r>
+              <a:rPr kumimoji="1" lang="en-US" altLang="zh-CN" sz="700" b="1" dirty="0"/>
+              <a:t>address1</a:t>
+            </a:r>
+            <a:endParaRPr kumimoji="1" lang="zh-CN" altLang="en-US" sz="700" b="1" dirty="0"/>
+          </a:p>
+        </p:txBody>
+      </p:sp>
+      <p:sp>
+        <p:nvSpPr>
+          <p:cNvPr id="147" name="文本框 146">
+            <a:extLst>
+              <a:ext uri="{FF2B5EF4-FFF2-40B4-BE49-F238E27FC236}">
+                <a16:creationId xmlns:a16="http://schemas.microsoft.com/office/drawing/2014/main" id="{53A00971-2E2D-DA05-46CB-953D2C9B281B}"/>
+              </a:ext>
+            </a:extLst>
+          </p:cNvPr>
+          <p:cNvSpPr txBox="1"/>
+          <p:nvPr/>
+        </p:nvSpPr>
+        <p:spPr>
+          <a:xfrm>
+            <a:off x="8604966" y="804999"/>
+            <a:ext cx="548548" cy="200055"/>
+          </a:xfrm>
+          <a:prstGeom prst="rect">
+            <a:avLst/>
+          </a:prstGeom>
+          <a:noFill/>
+        </p:spPr>
+        <p:txBody>
+          <a:bodyPr wrap="none" rtlCol="0">
+            <a:spAutoFit/>
+          </a:bodyPr>
+          <a:lstStyle/>
+          <a:p>
+            <a:r>
+              <a:rPr kumimoji="1" lang="en-US" altLang="zh-CN" sz="700" b="1" dirty="0"/>
+              <a:t>address2</a:t>
+            </a:r>
+            <a:endParaRPr kumimoji="1" lang="zh-CN" altLang="en-US" sz="700" b="1" dirty="0"/>
+          </a:p>
+        </p:txBody>
+      </p:sp>
+      <p:sp>
+        <p:nvSpPr>
+          <p:cNvPr id="148" name="文本框 147">
+            <a:extLst>
+              <a:ext uri="{FF2B5EF4-FFF2-40B4-BE49-F238E27FC236}">
+                <a16:creationId xmlns:a16="http://schemas.microsoft.com/office/drawing/2014/main" id="{84F3FDC2-353D-59FE-D841-31FC353CED83}"/>
+              </a:ext>
+            </a:extLst>
+          </p:cNvPr>
+          <p:cNvSpPr txBox="1"/>
+          <p:nvPr/>
+        </p:nvSpPr>
+        <p:spPr>
+          <a:xfrm>
+            <a:off x="10419705" y="813677"/>
+            <a:ext cx="548548" cy="200055"/>
+          </a:xfrm>
+          <a:prstGeom prst="rect">
+            <a:avLst/>
+          </a:prstGeom>
+          <a:noFill/>
+        </p:spPr>
+        <p:txBody>
+          <a:bodyPr wrap="none" rtlCol="0">
+            <a:spAutoFit/>
+          </a:bodyPr>
+          <a:lstStyle/>
+          <a:p>
+            <a:r>
+              <a:rPr kumimoji="1" lang="en-US" altLang="zh-CN" sz="700" b="1" dirty="0"/>
+              <a:t>address1</a:t>
+            </a:r>
+            <a:endParaRPr kumimoji="1" lang="zh-CN" altLang="en-US" sz="700" b="1" dirty="0"/>
+          </a:p>
+        </p:txBody>
+      </p:sp>
+      <p:sp>
+        <p:nvSpPr>
+          <p:cNvPr id="149" name="文本框 148">
+            <a:extLst>
+              <a:ext uri="{FF2B5EF4-FFF2-40B4-BE49-F238E27FC236}">
+                <a16:creationId xmlns:a16="http://schemas.microsoft.com/office/drawing/2014/main" id="{9A52F50F-55A4-E91E-6B4F-B1D8D41AA136}"/>
+              </a:ext>
+            </a:extLst>
+          </p:cNvPr>
+          <p:cNvSpPr txBox="1"/>
+          <p:nvPr/>
+        </p:nvSpPr>
+        <p:spPr>
+          <a:xfrm>
+            <a:off x="10814082" y="819184"/>
+            <a:ext cx="548548" cy="200055"/>
+          </a:xfrm>
+          <a:prstGeom prst="rect">
+            <a:avLst/>
+          </a:prstGeom>
+          <a:noFill/>
+        </p:spPr>
+        <p:txBody>
+          <a:bodyPr wrap="none" rtlCol="0">
+            <a:spAutoFit/>
+          </a:bodyPr>
+          <a:lstStyle/>
+          <a:p>
+            <a:r>
+              <a:rPr kumimoji="1" lang="en-US" altLang="zh-CN" sz="700" b="1" dirty="0"/>
+              <a:t>address2</a:t>
+            </a:r>
+            <a:endParaRPr kumimoji="1" lang="zh-CN" altLang="en-US" sz="700" b="1" dirty="0"/>
+          </a:p>
+        </p:txBody>
+      </p:sp>
+      <p:sp>
+        <p:nvSpPr>
+          <p:cNvPr id="150" name="文本框 149">
+            <a:extLst>
+              <a:ext uri="{FF2B5EF4-FFF2-40B4-BE49-F238E27FC236}">
+                <a16:creationId xmlns:a16="http://schemas.microsoft.com/office/drawing/2014/main" id="{DE04CADB-895C-F03C-0119-894FA590B997}"/>
+              </a:ext>
+            </a:extLst>
+          </p:cNvPr>
+          <p:cNvSpPr txBox="1"/>
+          <p:nvPr/>
+        </p:nvSpPr>
+        <p:spPr>
+          <a:xfrm>
+            <a:off x="8319598" y="614291"/>
+            <a:ext cx="755335" cy="215444"/>
+          </a:xfrm>
+          <a:prstGeom prst="rect">
+            <a:avLst/>
+          </a:prstGeom>
+          <a:noFill/>
+        </p:spPr>
+        <p:txBody>
+          <a:bodyPr wrap="none" rtlCol="0">
+            <a:spAutoFit/>
+          </a:bodyPr>
+          <a:lstStyle/>
+          <a:p>
+            <a:r>
+              <a:rPr kumimoji="1" lang="en-US" altLang="zh-CN" sz="800" b="1" dirty="0"/>
+              <a:t>Cybertwin A</a:t>
+            </a:r>
+            <a:endParaRPr kumimoji="1" lang="zh-CN" altLang="en-US" sz="800" b="1" dirty="0"/>
+          </a:p>
+        </p:txBody>
+      </p:sp>
+      <p:sp>
+        <p:nvSpPr>
+          <p:cNvPr id="151" name="文本框 150">
+            <a:extLst>
+              <a:ext uri="{FF2B5EF4-FFF2-40B4-BE49-F238E27FC236}">
+                <a16:creationId xmlns:a16="http://schemas.microsoft.com/office/drawing/2014/main" id="{7539A943-48EF-157B-5A65-7FB452F41090}"/>
+              </a:ext>
+            </a:extLst>
+          </p:cNvPr>
+          <p:cNvSpPr txBox="1"/>
+          <p:nvPr/>
+        </p:nvSpPr>
+        <p:spPr>
+          <a:xfrm>
+            <a:off x="10480292" y="628153"/>
+            <a:ext cx="748923" cy="215444"/>
+          </a:xfrm>
+          <a:prstGeom prst="rect">
+            <a:avLst/>
+          </a:prstGeom>
+          <a:noFill/>
+        </p:spPr>
+        <p:txBody>
+          <a:bodyPr wrap="none" rtlCol="0">
+            <a:spAutoFit/>
+          </a:bodyPr>
+          <a:lstStyle/>
+          <a:p>
+            <a:r>
+              <a:rPr kumimoji="1" lang="en-US" altLang="zh-CN" sz="800" b="1" dirty="0"/>
+              <a:t>Cybertwin B</a:t>
+            </a:r>
+            <a:endParaRPr kumimoji="1" lang="zh-CN" altLang="en-US" sz="800" b="1" dirty="0"/>
+          </a:p>
+        </p:txBody>
+      </p:sp>
+      <p:cxnSp>
+        <p:nvCxnSpPr>
+          <p:cNvPr id="152" name="直线连接符 151">
+            <a:extLst>
+              <a:ext uri="{FF2B5EF4-FFF2-40B4-BE49-F238E27FC236}">
+                <a16:creationId xmlns:a16="http://schemas.microsoft.com/office/drawing/2014/main" id="{372908CC-0782-CC70-1DF8-2110716DF448}"/>
+              </a:ext>
+            </a:extLst>
+          </p:cNvPr>
+          <p:cNvCxnSpPr>
+            <a:cxnSpLocks/>
+          </p:cNvCxnSpPr>
+          <p:nvPr/>
+        </p:nvCxnSpPr>
+        <p:spPr>
+          <a:xfrm>
+            <a:off x="7936327" y="2587635"/>
+            <a:ext cx="3292888" cy="21616"/>
+          </a:xfrm>
+          <a:prstGeom prst="line">
+            <a:avLst/>
+          </a:prstGeom>
+          <a:ln w="28575">
+            <a:solidFill>
+              <a:schemeClr val="tx1">
+                <a:lumMod val="85000"/>
+                <a:lumOff val="15000"/>
+              </a:schemeClr>
+            </a:solidFill>
+            <a:prstDash val="dashDot"/>
+          </a:ln>
+        </p:spPr>
+        <p:style>
+          <a:lnRef idx="1">
+            <a:schemeClr val="accent1"/>
+          </a:lnRef>
+          <a:fillRef idx="0">
+            <a:schemeClr val="accent1"/>
+          </a:fillRef>
+          <a:effectRef idx="0">
+            <a:schemeClr val="accent1"/>
+          </a:effectRef>
+          <a:fontRef idx="minor">
+            <a:schemeClr val="tx1"/>
+          </a:fontRef>
+        </p:style>
+      </p:cxnSp>
+      <p:cxnSp>
+        <p:nvCxnSpPr>
+          <p:cNvPr id="153" name="直线连接符 152">
+            <a:extLst>
+              <a:ext uri="{FF2B5EF4-FFF2-40B4-BE49-F238E27FC236}">
+                <a16:creationId xmlns:a16="http://schemas.microsoft.com/office/drawing/2014/main" id="{F50BC5E7-01E5-9DDC-99DD-BE073557C021}"/>
+              </a:ext>
+            </a:extLst>
+          </p:cNvPr>
+          <p:cNvCxnSpPr>
+            <a:cxnSpLocks/>
+          </p:cNvCxnSpPr>
+          <p:nvPr/>
+        </p:nvCxnSpPr>
+        <p:spPr>
+          <a:xfrm>
+            <a:off x="7981269" y="1147279"/>
+            <a:ext cx="3292887" cy="0"/>
+          </a:xfrm>
+          <a:prstGeom prst="line">
+            <a:avLst/>
+          </a:prstGeom>
+          <a:ln w="28575">
+            <a:solidFill>
+              <a:schemeClr val="tx1">
+                <a:lumMod val="85000"/>
+                <a:lumOff val="15000"/>
+              </a:schemeClr>
+            </a:solidFill>
+            <a:prstDash val="dashDot"/>
+          </a:ln>
+        </p:spPr>
+        <p:style>
+          <a:lnRef idx="1">
+            <a:schemeClr val="accent1"/>
+          </a:lnRef>
+          <a:fillRef idx="0">
+            <a:schemeClr val="accent1"/>
+          </a:fillRef>
+          <a:effectRef idx="0">
+            <a:schemeClr val="accent1"/>
+          </a:effectRef>
+          <a:fontRef idx="minor">
+            <a:schemeClr val="tx1"/>
+          </a:fontRef>
+        </p:style>
+      </p:cxnSp>
+      <p:sp>
+        <p:nvSpPr>
+          <p:cNvPr id="154" name="文本框 153">
+            <a:extLst>
+              <a:ext uri="{FF2B5EF4-FFF2-40B4-BE49-F238E27FC236}">
+                <a16:creationId xmlns:a16="http://schemas.microsoft.com/office/drawing/2014/main" id="{809883A1-4C85-E7BB-9242-6B77CD70880F}"/>
+              </a:ext>
+            </a:extLst>
+          </p:cNvPr>
+          <p:cNvSpPr txBox="1"/>
+          <p:nvPr/>
+        </p:nvSpPr>
+        <p:spPr>
+          <a:xfrm>
+            <a:off x="7935005" y="3075261"/>
+            <a:ext cx="292388" cy="566822"/>
+          </a:xfrm>
+          <a:prstGeom prst="rect">
+            <a:avLst/>
+          </a:prstGeom>
+          <a:noFill/>
+        </p:spPr>
+        <p:txBody>
+          <a:bodyPr vert="eaVert" wrap="none" rtlCol="0">
+            <a:spAutoFit/>
+          </a:bodyPr>
+          <a:lstStyle/>
+          <a:p>
+            <a:r>
+              <a:rPr kumimoji="1" lang="en-US" altLang="zh-CN" sz="700" b="1" dirty="0"/>
+              <a:t>TCP closure</a:t>
+            </a:r>
+            <a:endParaRPr kumimoji="1" lang="zh-CN" altLang="en-US" sz="700" b="1" dirty="0"/>
+          </a:p>
+        </p:txBody>
+      </p:sp>
+      <p:cxnSp>
+        <p:nvCxnSpPr>
+          <p:cNvPr id="156" name="直线连接符 155">
+            <a:extLst>
+              <a:ext uri="{FF2B5EF4-FFF2-40B4-BE49-F238E27FC236}">
+                <a16:creationId xmlns:a16="http://schemas.microsoft.com/office/drawing/2014/main" id="{1C3D80AC-3131-2284-5191-B63B6574713C}"/>
+              </a:ext>
+            </a:extLst>
+          </p:cNvPr>
+          <p:cNvCxnSpPr>
+            <a:cxnSpLocks/>
+          </p:cNvCxnSpPr>
+          <p:nvPr/>
+        </p:nvCxnSpPr>
+        <p:spPr>
+          <a:xfrm>
+            <a:off x="7981269" y="4048533"/>
+            <a:ext cx="3292888" cy="21616"/>
+          </a:xfrm>
+          <a:prstGeom prst="line">
+            <a:avLst/>
+          </a:prstGeom>
+          <a:ln w="28575">
+            <a:solidFill>
+              <a:schemeClr val="tx1">
+                <a:lumMod val="85000"/>
+                <a:lumOff val="15000"/>
+              </a:schemeClr>
+            </a:solidFill>
+            <a:prstDash val="dashDot"/>
+          </a:ln>
+        </p:spPr>
+        <p:style>
+          <a:lnRef idx="1">
+            <a:schemeClr val="accent1"/>
+          </a:lnRef>
+          <a:fillRef idx="0">
+            <a:schemeClr val="accent1"/>
+          </a:fillRef>
+          <a:effectRef idx="0">
+            <a:schemeClr val="accent1"/>
+          </a:effectRef>
+          <a:fontRef idx="minor">
+            <a:schemeClr val="tx1"/>
+          </a:fontRef>
+        </p:style>
+      </p:cxnSp>
+      <p:sp>
+        <p:nvSpPr>
+          <p:cNvPr id="157" name="文本框 156">
+            <a:extLst>
+              <a:ext uri="{FF2B5EF4-FFF2-40B4-BE49-F238E27FC236}">
+                <a16:creationId xmlns:a16="http://schemas.microsoft.com/office/drawing/2014/main" id="{696ABC0A-573B-AC29-904D-6443C84645A1}"/>
+              </a:ext>
+            </a:extLst>
+          </p:cNvPr>
+          <p:cNvSpPr txBox="1"/>
+          <p:nvPr/>
+        </p:nvSpPr>
+        <p:spPr>
+          <a:xfrm>
+            <a:off x="7956546" y="1474047"/>
+            <a:ext cx="292388" cy="672620"/>
+          </a:xfrm>
+          <a:prstGeom prst="rect">
+            <a:avLst/>
+          </a:prstGeom>
+          <a:noFill/>
+        </p:spPr>
+        <p:txBody>
+          <a:bodyPr vert="eaVert" wrap="none" rtlCol="0">
+            <a:spAutoFit/>
+          </a:bodyPr>
+          <a:lstStyle/>
+          <a:p>
+            <a:r>
+              <a:rPr kumimoji="1" lang="en-US" altLang="zh-CN" sz="700" b="1" dirty="0"/>
+              <a:t>MDTP Closure</a:t>
+            </a:r>
+            <a:endParaRPr kumimoji="1" lang="zh-CN" altLang="en-US" sz="700" b="1" dirty="0"/>
+          </a:p>
+        </p:txBody>
+      </p:sp>
+      <p:cxnSp>
+        <p:nvCxnSpPr>
+          <p:cNvPr id="159" name="直接箭头连接符 50">
+            <a:extLst>
+              <a:ext uri="{FF2B5EF4-FFF2-40B4-BE49-F238E27FC236}">
+                <a16:creationId xmlns:a16="http://schemas.microsoft.com/office/drawing/2014/main" id="{B79C6FBF-C54F-DB3E-2AAB-F8D064C2F9BB}"/>
+              </a:ext>
+            </a:extLst>
+          </p:cNvPr>
+          <p:cNvCxnSpPr>
+            <a:cxnSpLocks/>
+          </p:cNvCxnSpPr>
+          <p:nvPr/>
+        </p:nvCxnSpPr>
+        <p:spPr>
+          <a:xfrm>
+            <a:off x="8848654" y="1359385"/>
+            <a:ext cx="2204485" cy="88080"/>
+          </a:xfrm>
+          <a:prstGeom prst="straightConnector1">
+            <a:avLst/>
+          </a:prstGeom>
+          <a:ln w="12700">
+            <a:solidFill>
+              <a:srgbClr val="008D57"/>
+            </a:solidFill>
+            <a:tailEnd type="triangle"/>
+          </a:ln>
+        </p:spPr>
+        <p:style>
+          <a:lnRef idx="1">
+            <a:schemeClr val="accent1"/>
+          </a:lnRef>
+          <a:fillRef idx="0">
+            <a:schemeClr val="accent1"/>
+          </a:fillRef>
+          <a:effectRef idx="0">
+            <a:schemeClr val="accent1"/>
+          </a:effectRef>
+          <a:fontRef idx="minor">
+            <a:schemeClr val="tx1"/>
+          </a:fontRef>
+        </p:style>
+      </p:cxnSp>
+      <p:sp>
+        <p:nvSpPr>
+          <p:cNvPr id="160" name="文本框 159">
+            <a:extLst>
+              <a:ext uri="{FF2B5EF4-FFF2-40B4-BE49-F238E27FC236}">
+                <a16:creationId xmlns:a16="http://schemas.microsoft.com/office/drawing/2014/main" id="{E42D21F5-730D-F0CC-6C41-8EDA107268E0}"/>
+              </a:ext>
+            </a:extLst>
+          </p:cNvPr>
+          <p:cNvSpPr txBox="1"/>
+          <p:nvPr/>
+        </p:nvSpPr>
+        <p:spPr>
+          <a:xfrm>
+            <a:off x="9069896" y="1228411"/>
+            <a:ext cx="1144865" cy="200055"/>
+          </a:xfrm>
+          <a:prstGeom prst="rect">
+            <a:avLst/>
+          </a:prstGeom>
+          <a:noFill/>
+        </p:spPr>
+        <p:txBody>
+          <a:bodyPr wrap="none" rtlCol="0">
+            <a:spAutoFit/>
+          </a:bodyPr>
+          <a:lstStyle/>
+          <a:p>
+            <a:r>
+              <a:rPr lang="en-US" altLang="zh-CN" sz="700" b="1" dirty="0"/>
+              <a:t>CUID1, Path ID2, CLOSE</a:t>
+            </a:r>
+            <a:endParaRPr lang="zh-CN" altLang="en-US" sz="700" b="1" dirty="0"/>
+          </a:p>
+        </p:txBody>
+      </p:sp>
+      <p:cxnSp>
+        <p:nvCxnSpPr>
+          <p:cNvPr id="161" name="直接箭头连接符 50">
+            <a:extLst>
+              <a:ext uri="{FF2B5EF4-FFF2-40B4-BE49-F238E27FC236}">
+                <a16:creationId xmlns:a16="http://schemas.microsoft.com/office/drawing/2014/main" id="{C9DB9F31-F969-3F07-0837-C3651FBF3038}"/>
+              </a:ext>
+            </a:extLst>
+          </p:cNvPr>
+          <p:cNvCxnSpPr>
+            <a:cxnSpLocks/>
+          </p:cNvCxnSpPr>
+          <p:nvPr/>
+        </p:nvCxnSpPr>
+        <p:spPr>
+          <a:xfrm flipH="1">
+            <a:off x="8838866" y="1589722"/>
+            <a:ext cx="2202901" cy="119031"/>
+          </a:xfrm>
+          <a:prstGeom prst="straightConnector1">
+            <a:avLst/>
+          </a:prstGeom>
+          <a:ln w="12700">
+            <a:solidFill>
+              <a:srgbClr val="008D57"/>
+            </a:solidFill>
+            <a:tailEnd type="triangle"/>
+          </a:ln>
+        </p:spPr>
+        <p:style>
+          <a:lnRef idx="1">
+            <a:schemeClr val="accent1"/>
+          </a:lnRef>
+          <a:fillRef idx="0">
+            <a:schemeClr val="accent1"/>
+          </a:fillRef>
+          <a:effectRef idx="0">
+            <a:schemeClr val="accent1"/>
+          </a:effectRef>
+          <a:fontRef idx="minor">
+            <a:schemeClr val="tx1"/>
+          </a:fontRef>
+        </p:style>
+      </p:cxnSp>
+      <p:sp>
+        <p:nvSpPr>
+          <p:cNvPr id="166" name="文本框 165">
+            <a:extLst>
+              <a:ext uri="{FF2B5EF4-FFF2-40B4-BE49-F238E27FC236}">
+                <a16:creationId xmlns:a16="http://schemas.microsoft.com/office/drawing/2014/main" id="{37E560A9-FA91-0D3F-731B-A3EF29034631}"/>
+              </a:ext>
+            </a:extLst>
+          </p:cNvPr>
+          <p:cNvSpPr txBox="1"/>
+          <p:nvPr/>
+        </p:nvSpPr>
+        <p:spPr>
+          <a:xfrm>
+            <a:off x="9069896" y="1501642"/>
+            <a:ext cx="1340432" cy="200055"/>
+          </a:xfrm>
+          <a:prstGeom prst="rect">
+            <a:avLst/>
+          </a:prstGeom>
+          <a:noFill/>
+        </p:spPr>
+        <p:txBody>
+          <a:bodyPr wrap="none" rtlCol="0">
+            <a:spAutoFit/>
+          </a:bodyPr>
+          <a:lstStyle/>
+          <a:p>
+            <a:r>
+              <a:rPr lang="en-US" altLang="zh-CN" sz="700" b="1" dirty="0"/>
+              <a:t>CUID2, Path ID2, CLOSE ACK</a:t>
+            </a:r>
+            <a:endParaRPr lang="zh-CN" altLang="en-US" sz="700" b="1" dirty="0"/>
+          </a:p>
+        </p:txBody>
+      </p:sp>
+      <p:cxnSp>
+        <p:nvCxnSpPr>
+          <p:cNvPr id="167" name="直接箭头连接符 49">
+            <a:extLst>
+              <a:ext uri="{FF2B5EF4-FFF2-40B4-BE49-F238E27FC236}">
+                <a16:creationId xmlns:a16="http://schemas.microsoft.com/office/drawing/2014/main" id="{510BE953-35E3-70AA-AC6D-477148075917}"/>
+              </a:ext>
+            </a:extLst>
+          </p:cNvPr>
+          <p:cNvCxnSpPr>
+            <a:cxnSpLocks/>
+          </p:cNvCxnSpPr>
+          <p:nvPr/>
+        </p:nvCxnSpPr>
+        <p:spPr>
+          <a:xfrm>
+            <a:off x="8497553" y="1989333"/>
+            <a:ext cx="2210152" cy="140070"/>
+          </a:xfrm>
+          <a:prstGeom prst="straightConnector1">
+            <a:avLst/>
+          </a:prstGeom>
+          <a:ln w="12700">
+            <a:solidFill>
+              <a:srgbClr val="FFC000"/>
+            </a:solidFill>
+            <a:tailEnd type="triangle"/>
+          </a:ln>
+        </p:spPr>
+        <p:style>
+          <a:lnRef idx="1">
+            <a:schemeClr val="accent1"/>
+          </a:lnRef>
+          <a:fillRef idx="0">
+            <a:schemeClr val="accent1"/>
+          </a:fillRef>
+          <a:effectRef idx="0">
+            <a:schemeClr val="accent1"/>
+          </a:effectRef>
+          <a:fontRef idx="minor">
+            <a:schemeClr val="tx1"/>
+          </a:fontRef>
+        </p:style>
+      </p:cxnSp>
+      <p:cxnSp>
+        <p:nvCxnSpPr>
+          <p:cNvPr id="169" name="直接箭头连接符 49">
+            <a:extLst>
+              <a:ext uri="{FF2B5EF4-FFF2-40B4-BE49-F238E27FC236}">
+                <a16:creationId xmlns:a16="http://schemas.microsoft.com/office/drawing/2014/main" id="{46DA8037-4570-2C89-B9CE-23E4D595A45E}"/>
+              </a:ext>
+            </a:extLst>
+          </p:cNvPr>
+          <p:cNvCxnSpPr>
+            <a:cxnSpLocks/>
+          </p:cNvCxnSpPr>
+          <p:nvPr/>
+        </p:nvCxnSpPr>
+        <p:spPr>
+          <a:xfrm flipH="1">
+            <a:off x="8488667" y="2285472"/>
+            <a:ext cx="2195917" cy="187708"/>
+          </a:xfrm>
+          <a:prstGeom prst="straightConnector1">
+            <a:avLst/>
+          </a:prstGeom>
+          <a:ln w="12700">
+            <a:solidFill>
+              <a:srgbClr val="FFC000"/>
+            </a:solidFill>
+            <a:tailEnd type="triangle"/>
+          </a:ln>
+        </p:spPr>
+        <p:style>
+          <a:lnRef idx="1">
+            <a:schemeClr val="accent1"/>
+          </a:lnRef>
+          <a:fillRef idx="0">
+            <a:schemeClr val="accent1"/>
+          </a:fillRef>
+          <a:effectRef idx="0">
+            <a:schemeClr val="accent1"/>
+          </a:effectRef>
+          <a:fontRef idx="minor">
+            <a:schemeClr val="tx1"/>
+          </a:fontRef>
+        </p:style>
+      </p:cxnSp>
+      <p:sp>
+        <p:nvSpPr>
+          <p:cNvPr id="174" name="文本框 173">
+            <a:extLst>
+              <a:ext uri="{FF2B5EF4-FFF2-40B4-BE49-F238E27FC236}">
+                <a16:creationId xmlns:a16="http://schemas.microsoft.com/office/drawing/2014/main" id="{C17AA532-A1F6-8E53-69DE-FF304FF77EF2}"/>
+              </a:ext>
+            </a:extLst>
+          </p:cNvPr>
+          <p:cNvSpPr txBox="1"/>
+          <p:nvPr/>
+        </p:nvSpPr>
+        <p:spPr>
+          <a:xfrm>
+            <a:off x="8811072" y="1846651"/>
+            <a:ext cx="1144865" cy="200055"/>
+          </a:xfrm>
+          <a:prstGeom prst="rect">
+            <a:avLst/>
+          </a:prstGeom>
+          <a:noFill/>
+        </p:spPr>
+        <p:txBody>
+          <a:bodyPr wrap="none" rtlCol="0">
+            <a:spAutoFit/>
+          </a:bodyPr>
+          <a:lstStyle/>
+          <a:p>
+            <a:r>
+              <a:rPr lang="en-US" altLang="zh-CN" sz="700" b="1" dirty="0"/>
+              <a:t>CUID1, Path ID1, CLOSE</a:t>
+            </a:r>
+            <a:endParaRPr lang="zh-CN" altLang="en-US" sz="700" b="1" dirty="0"/>
+          </a:p>
+        </p:txBody>
+      </p:sp>
+      <p:sp>
+        <p:nvSpPr>
+          <p:cNvPr id="175" name="文本框 174">
+            <a:extLst>
+              <a:ext uri="{FF2B5EF4-FFF2-40B4-BE49-F238E27FC236}">
+                <a16:creationId xmlns:a16="http://schemas.microsoft.com/office/drawing/2014/main" id="{1B1F18D0-1A3F-D575-E591-FEFB0AB8B8B0}"/>
+              </a:ext>
+            </a:extLst>
+          </p:cNvPr>
+          <p:cNvSpPr txBox="1"/>
+          <p:nvPr/>
+        </p:nvSpPr>
+        <p:spPr>
+          <a:xfrm>
+            <a:off x="8811644" y="2232047"/>
+            <a:ext cx="1340432" cy="200055"/>
+          </a:xfrm>
+          <a:prstGeom prst="rect">
+            <a:avLst/>
+          </a:prstGeom>
+          <a:noFill/>
+        </p:spPr>
+        <p:txBody>
+          <a:bodyPr wrap="none" rtlCol="0">
+            <a:spAutoFit/>
+          </a:bodyPr>
+          <a:lstStyle/>
+          <a:p>
+            <a:r>
+              <a:rPr lang="en-US" altLang="zh-CN" sz="700" b="1" dirty="0"/>
+              <a:t>CUID1, Path ID1, CLOSE ACK</a:t>
+            </a:r>
+            <a:endParaRPr lang="zh-CN" altLang="en-US" sz="700" b="1" dirty="0"/>
+          </a:p>
+        </p:txBody>
+      </p:sp>
+      <p:cxnSp>
+        <p:nvCxnSpPr>
+          <p:cNvPr id="176" name="直接箭头连接符 49">
+            <a:extLst>
+              <a:ext uri="{FF2B5EF4-FFF2-40B4-BE49-F238E27FC236}">
+                <a16:creationId xmlns:a16="http://schemas.microsoft.com/office/drawing/2014/main" id="{75603D31-D0CB-4E65-3931-E272BC24B221}"/>
+              </a:ext>
+            </a:extLst>
+          </p:cNvPr>
+          <p:cNvCxnSpPr>
+            <a:cxnSpLocks/>
+          </p:cNvCxnSpPr>
+          <p:nvPr/>
+        </p:nvCxnSpPr>
+        <p:spPr>
+          <a:xfrm>
+            <a:off x="8505128" y="2829958"/>
+            <a:ext cx="2210152" cy="140070"/>
+          </a:xfrm>
+          <a:prstGeom prst="straightConnector1">
+            <a:avLst/>
+          </a:prstGeom>
+          <a:ln w="12700">
+            <a:solidFill>
+              <a:srgbClr val="FFC000"/>
+            </a:solidFill>
+            <a:tailEnd type="triangle"/>
+          </a:ln>
+        </p:spPr>
+        <p:style>
+          <a:lnRef idx="1">
+            <a:schemeClr val="accent1"/>
+          </a:lnRef>
+          <a:fillRef idx="0">
+            <a:schemeClr val="accent1"/>
+          </a:fillRef>
+          <a:effectRef idx="0">
+            <a:schemeClr val="accent1"/>
+          </a:effectRef>
+          <a:fontRef idx="minor">
+            <a:schemeClr val="tx1"/>
+          </a:fontRef>
+        </p:style>
+      </p:cxnSp>
+      <p:cxnSp>
+        <p:nvCxnSpPr>
+          <p:cNvPr id="177" name="直接箭头连接符 50">
+            <a:extLst>
+              <a:ext uri="{FF2B5EF4-FFF2-40B4-BE49-F238E27FC236}">
+                <a16:creationId xmlns:a16="http://schemas.microsoft.com/office/drawing/2014/main" id="{E6B62A06-A94D-D789-F93C-003DBCF96571}"/>
+              </a:ext>
+            </a:extLst>
+          </p:cNvPr>
+          <p:cNvCxnSpPr>
+            <a:cxnSpLocks/>
+          </p:cNvCxnSpPr>
+          <p:nvPr/>
+        </p:nvCxnSpPr>
+        <p:spPr>
+          <a:xfrm>
+            <a:off x="8835658" y="3065811"/>
+            <a:ext cx="2197606" cy="136036"/>
+          </a:xfrm>
+          <a:prstGeom prst="straightConnector1">
+            <a:avLst/>
+          </a:prstGeom>
+          <a:ln w="12700">
+            <a:solidFill>
+              <a:srgbClr val="008D57"/>
+            </a:solidFill>
+            <a:tailEnd type="triangle"/>
+          </a:ln>
+        </p:spPr>
+        <p:style>
+          <a:lnRef idx="1">
+            <a:schemeClr val="accent1"/>
+          </a:lnRef>
+          <a:fillRef idx="0">
+            <a:schemeClr val="accent1"/>
+          </a:fillRef>
+          <a:effectRef idx="0">
+            <a:schemeClr val="accent1"/>
+          </a:effectRef>
+          <a:fontRef idx="minor">
+            <a:schemeClr val="tx1"/>
+          </a:fontRef>
+        </p:style>
+      </p:cxnSp>
+      <p:sp>
+        <p:nvSpPr>
+          <p:cNvPr id="179" name="文本框 178">
+            <a:extLst>
+              <a:ext uri="{FF2B5EF4-FFF2-40B4-BE49-F238E27FC236}">
+                <a16:creationId xmlns:a16="http://schemas.microsoft.com/office/drawing/2014/main" id="{321625F3-AB11-9836-AE4C-DFF2B382570D}"/>
+              </a:ext>
+            </a:extLst>
+          </p:cNvPr>
+          <p:cNvSpPr txBox="1"/>
+          <p:nvPr/>
+        </p:nvSpPr>
+        <p:spPr>
+          <a:xfrm>
+            <a:off x="8855540" y="2682406"/>
+            <a:ext cx="506870" cy="200055"/>
+          </a:xfrm>
+          <a:prstGeom prst="rect">
+            <a:avLst/>
+          </a:prstGeom>
+          <a:noFill/>
+        </p:spPr>
+        <p:txBody>
+          <a:bodyPr wrap="none" rtlCol="0">
+            <a:spAutoFit/>
+          </a:bodyPr>
+          <a:lstStyle/>
+          <a:p>
+            <a:r>
+              <a:rPr lang="en-US" altLang="zh-CN" sz="700" b="1" dirty="0"/>
+              <a:t>TCP FIN</a:t>
+            </a:r>
+            <a:endParaRPr lang="zh-CN" altLang="en-US" sz="700" b="1" dirty="0"/>
+          </a:p>
+        </p:txBody>
+      </p:sp>
+      <p:sp>
+        <p:nvSpPr>
+          <p:cNvPr id="180" name="文本框 179">
+            <a:extLst>
+              <a:ext uri="{FF2B5EF4-FFF2-40B4-BE49-F238E27FC236}">
+                <a16:creationId xmlns:a16="http://schemas.microsoft.com/office/drawing/2014/main" id="{FDAFB8DC-FE8F-3579-2FCF-5A44A55447AD}"/>
+              </a:ext>
+            </a:extLst>
+          </p:cNvPr>
+          <p:cNvSpPr txBox="1"/>
+          <p:nvPr/>
+        </p:nvSpPr>
+        <p:spPr>
+          <a:xfrm>
+            <a:off x="8794611" y="3186138"/>
+            <a:ext cx="724878" cy="200055"/>
+          </a:xfrm>
+          <a:prstGeom prst="rect">
+            <a:avLst/>
+          </a:prstGeom>
+          <a:noFill/>
+        </p:spPr>
+        <p:txBody>
+          <a:bodyPr wrap="none" rtlCol="0">
+            <a:spAutoFit/>
+          </a:bodyPr>
+          <a:lstStyle/>
+          <a:p>
+            <a:r>
+              <a:rPr lang="en-US" altLang="zh-CN" sz="700" b="1" dirty="0"/>
+              <a:t>TCP FIN, ACK</a:t>
+            </a:r>
+            <a:endParaRPr lang="zh-CN" altLang="en-US" sz="700" b="1" dirty="0"/>
+          </a:p>
+        </p:txBody>
+      </p:sp>
+      <p:cxnSp>
+        <p:nvCxnSpPr>
+          <p:cNvPr id="181" name="直接箭头连接符 49">
+            <a:extLst>
+              <a:ext uri="{FF2B5EF4-FFF2-40B4-BE49-F238E27FC236}">
+                <a16:creationId xmlns:a16="http://schemas.microsoft.com/office/drawing/2014/main" id="{093CEFFA-96E3-0023-202B-4B67D8C1DFE0}"/>
+              </a:ext>
+            </a:extLst>
+          </p:cNvPr>
+          <p:cNvCxnSpPr>
+            <a:cxnSpLocks/>
+          </p:cNvCxnSpPr>
+          <p:nvPr/>
+        </p:nvCxnSpPr>
+        <p:spPr>
+          <a:xfrm flipH="1">
+            <a:off x="8503195" y="3033693"/>
+            <a:ext cx="2195280" cy="260865"/>
+          </a:xfrm>
+          <a:prstGeom prst="straightConnector1">
+            <a:avLst/>
+          </a:prstGeom>
+          <a:ln w="12700">
+            <a:solidFill>
+              <a:srgbClr val="FFC000"/>
+            </a:solidFill>
+            <a:tailEnd type="triangle"/>
+          </a:ln>
+        </p:spPr>
+        <p:style>
+          <a:lnRef idx="1">
+            <a:schemeClr val="accent1"/>
+          </a:lnRef>
+          <a:fillRef idx="0">
+            <a:schemeClr val="accent1"/>
+          </a:fillRef>
+          <a:effectRef idx="0">
+            <a:schemeClr val="accent1"/>
+          </a:effectRef>
+          <a:fontRef idx="minor">
+            <a:schemeClr val="tx1"/>
+          </a:fontRef>
+        </p:style>
+      </p:cxnSp>
+      <p:sp>
+        <p:nvSpPr>
+          <p:cNvPr id="185" name="文本框 184">
+            <a:extLst>
+              <a:ext uri="{FF2B5EF4-FFF2-40B4-BE49-F238E27FC236}">
+                <a16:creationId xmlns:a16="http://schemas.microsoft.com/office/drawing/2014/main" id="{25222204-8992-3974-4DDE-8197DA85755B}"/>
+              </a:ext>
+            </a:extLst>
+          </p:cNvPr>
+          <p:cNvSpPr txBox="1"/>
+          <p:nvPr/>
+        </p:nvSpPr>
+        <p:spPr>
+          <a:xfrm>
+            <a:off x="9230333" y="2930866"/>
+            <a:ext cx="506870" cy="200055"/>
+          </a:xfrm>
+          <a:prstGeom prst="rect">
+            <a:avLst/>
+          </a:prstGeom>
+          <a:noFill/>
+        </p:spPr>
+        <p:txBody>
+          <a:bodyPr wrap="none" rtlCol="0">
+            <a:spAutoFit/>
+          </a:bodyPr>
+          <a:lstStyle/>
+          <a:p>
+            <a:r>
+              <a:rPr lang="en-US" altLang="zh-CN" sz="700" b="1" dirty="0"/>
+              <a:t>TCP FIN</a:t>
+            </a:r>
+            <a:endParaRPr lang="zh-CN" altLang="en-US" sz="700" b="1" dirty="0"/>
+          </a:p>
+        </p:txBody>
+      </p:sp>
+      <p:cxnSp>
+        <p:nvCxnSpPr>
+          <p:cNvPr id="186" name="直接箭头连接符 49">
+            <a:extLst>
+              <a:ext uri="{FF2B5EF4-FFF2-40B4-BE49-F238E27FC236}">
+                <a16:creationId xmlns:a16="http://schemas.microsoft.com/office/drawing/2014/main" id="{10CFF4B5-9FD7-A845-EB8B-8E0CD626F59E}"/>
+              </a:ext>
+            </a:extLst>
+          </p:cNvPr>
+          <p:cNvCxnSpPr>
+            <a:cxnSpLocks/>
+          </p:cNvCxnSpPr>
+          <p:nvPr/>
+        </p:nvCxnSpPr>
+        <p:spPr>
+          <a:xfrm>
+            <a:off x="8527593" y="3652573"/>
+            <a:ext cx="2210152" cy="140070"/>
+          </a:xfrm>
+          <a:prstGeom prst="straightConnector1">
+            <a:avLst/>
+          </a:prstGeom>
+          <a:ln w="12700">
+            <a:solidFill>
+              <a:srgbClr val="FFC000"/>
+            </a:solidFill>
+            <a:tailEnd type="triangle"/>
+          </a:ln>
+        </p:spPr>
+        <p:style>
+          <a:lnRef idx="1">
+            <a:schemeClr val="accent1"/>
+          </a:lnRef>
+          <a:fillRef idx="0">
+            <a:schemeClr val="accent1"/>
+          </a:fillRef>
+          <a:effectRef idx="0">
+            <a:schemeClr val="accent1"/>
+          </a:effectRef>
+          <a:fontRef idx="minor">
+            <a:schemeClr val="tx1"/>
+          </a:fontRef>
+        </p:style>
+      </p:cxnSp>
+      <p:sp>
+        <p:nvSpPr>
+          <p:cNvPr id="187" name="文本框 186">
+            <a:extLst>
+              <a:ext uri="{FF2B5EF4-FFF2-40B4-BE49-F238E27FC236}">
+                <a16:creationId xmlns:a16="http://schemas.microsoft.com/office/drawing/2014/main" id="{05A5323F-C0AF-4923-090E-15213BA572AE}"/>
+              </a:ext>
+            </a:extLst>
+          </p:cNvPr>
+          <p:cNvSpPr txBox="1"/>
+          <p:nvPr/>
+        </p:nvSpPr>
+        <p:spPr>
+          <a:xfrm>
+            <a:off x="9284492" y="3361750"/>
+            <a:ext cx="538930" cy="200055"/>
+          </a:xfrm>
+          <a:prstGeom prst="rect">
+            <a:avLst/>
+          </a:prstGeom>
+          <a:noFill/>
+        </p:spPr>
+        <p:txBody>
+          <a:bodyPr wrap="none" rtlCol="0">
+            <a:spAutoFit/>
+          </a:bodyPr>
+          <a:lstStyle/>
+          <a:p>
+            <a:r>
+              <a:rPr lang="en-US" altLang="zh-CN" sz="700" b="1" dirty="0"/>
+              <a:t>TCP ACK</a:t>
+            </a:r>
+            <a:endParaRPr lang="zh-CN" altLang="en-US" sz="700" b="1" dirty="0"/>
+          </a:p>
+        </p:txBody>
+      </p:sp>
+      <p:cxnSp>
+        <p:nvCxnSpPr>
+          <p:cNvPr id="188" name="直接箭头连接符 50">
+            <a:extLst>
+              <a:ext uri="{FF2B5EF4-FFF2-40B4-BE49-F238E27FC236}">
+                <a16:creationId xmlns:a16="http://schemas.microsoft.com/office/drawing/2014/main" id="{F5464098-C140-A32B-AFC7-1A3AAF03CD59}"/>
+              </a:ext>
+            </a:extLst>
+          </p:cNvPr>
+          <p:cNvCxnSpPr>
+            <a:cxnSpLocks/>
+          </p:cNvCxnSpPr>
+          <p:nvPr/>
+        </p:nvCxnSpPr>
+        <p:spPr>
+          <a:xfrm flipH="1">
+            <a:off x="8817216" y="3245619"/>
+            <a:ext cx="2231430" cy="304289"/>
+          </a:xfrm>
+          <a:prstGeom prst="straightConnector1">
+            <a:avLst/>
+          </a:prstGeom>
+          <a:ln w="12700">
+            <a:solidFill>
+              <a:srgbClr val="008D57"/>
+            </a:solidFill>
+            <a:tailEnd type="triangle"/>
+          </a:ln>
+        </p:spPr>
+        <p:style>
+          <a:lnRef idx="1">
+            <a:schemeClr val="accent1"/>
+          </a:lnRef>
+          <a:fillRef idx="0">
+            <a:schemeClr val="accent1"/>
+          </a:fillRef>
+          <a:effectRef idx="0">
+            <a:schemeClr val="accent1"/>
+          </a:effectRef>
+          <a:fontRef idx="minor">
+            <a:schemeClr val="tx1"/>
+          </a:fontRef>
+        </p:style>
+      </p:cxnSp>
+      <p:sp>
+        <p:nvSpPr>
+          <p:cNvPr id="193" name="文本框 192">
+            <a:extLst>
+              <a:ext uri="{FF2B5EF4-FFF2-40B4-BE49-F238E27FC236}">
+                <a16:creationId xmlns:a16="http://schemas.microsoft.com/office/drawing/2014/main" id="{A50EF896-533A-DAC2-77DB-E11DE37F0E9E}"/>
+              </a:ext>
+            </a:extLst>
+          </p:cNvPr>
+          <p:cNvSpPr txBox="1"/>
+          <p:nvPr/>
+        </p:nvSpPr>
+        <p:spPr>
+          <a:xfrm>
+            <a:off x="8975203" y="3635102"/>
+            <a:ext cx="562975" cy="200055"/>
+          </a:xfrm>
+          <a:prstGeom prst="rect">
+            <a:avLst/>
+          </a:prstGeom>
+          <a:noFill/>
+        </p:spPr>
+        <p:txBody>
+          <a:bodyPr wrap="none" rtlCol="0">
+            <a:spAutoFit/>
+          </a:bodyPr>
+          <a:lstStyle/>
+          <a:p>
+            <a:r>
+              <a:rPr lang="en-US" altLang="zh-CN" sz="700" b="1" dirty="0"/>
+              <a:t>TCP  ACK</a:t>
+            </a:r>
+            <a:endParaRPr lang="zh-CN" altLang="en-US" sz="700" b="1" dirty="0"/>
+          </a:p>
+        </p:txBody>
+      </p:sp>
+      <p:cxnSp>
+        <p:nvCxnSpPr>
+          <p:cNvPr id="196" name="直接箭头连接符 50">
+            <a:extLst>
+              <a:ext uri="{FF2B5EF4-FFF2-40B4-BE49-F238E27FC236}">
+                <a16:creationId xmlns:a16="http://schemas.microsoft.com/office/drawing/2014/main" id="{3F2E5A00-9348-1722-CDF9-A210096A3082}"/>
+              </a:ext>
+            </a:extLst>
+          </p:cNvPr>
+          <p:cNvCxnSpPr>
+            <a:cxnSpLocks/>
+          </p:cNvCxnSpPr>
+          <p:nvPr/>
+        </p:nvCxnSpPr>
+        <p:spPr>
+          <a:xfrm>
+            <a:off x="8841513" y="3847722"/>
+            <a:ext cx="2197606" cy="136036"/>
+          </a:xfrm>
+          <a:prstGeom prst="straightConnector1">
+            <a:avLst/>
+          </a:prstGeom>
+          <a:ln w="12700">
+            <a:solidFill>
+              <a:srgbClr val="008D57"/>
+            </a:solidFill>
+            <a:tailEnd type="triangle"/>
+          </a:ln>
+        </p:spPr>
+        <p:style>
+          <a:lnRef idx="1">
+            <a:schemeClr val="accent1"/>
+          </a:lnRef>
+          <a:fillRef idx="0">
+            <a:schemeClr val="accent1"/>
+          </a:fillRef>
+          <a:effectRef idx="0">
+            <a:schemeClr val="accent1"/>
+          </a:effectRef>
+          <a:fontRef idx="minor">
+            <a:schemeClr val="tx1"/>
+          </a:fontRef>
+        </p:style>
+      </p:cxnSp>
+      <p:sp>
+        <p:nvSpPr>
+          <p:cNvPr id="197" name="文本框 196">
+            <a:extLst>
+              <a:ext uri="{FF2B5EF4-FFF2-40B4-BE49-F238E27FC236}">
+                <a16:creationId xmlns:a16="http://schemas.microsoft.com/office/drawing/2014/main" id="{74D14F8C-CAA3-B361-5755-0E776E46FF62}"/>
+              </a:ext>
+            </a:extLst>
+          </p:cNvPr>
+          <p:cNvSpPr txBox="1"/>
+          <p:nvPr/>
+        </p:nvSpPr>
+        <p:spPr>
+          <a:xfrm>
+            <a:off x="9256690" y="3785825"/>
+            <a:ext cx="562975" cy="200055"/>
+          </a:xfrm>
+          <a:prstGeom prst="rect">
+            <a:avLst/>
+          </a:prstGeom>
+          <a:noFill/>
+        </p:spPr>
+        <p:txBody>
+          <a:bodyPr wrap="none" rtlCol="0">
+            <a:spAutoFit/>
+          </a:bodyPr>
+          <a:lstStyle/>
+          <a:p>
+            <a:r>
+              <a:rPr lang="en-US" altLang="zh-CN" sz="700" b="1" dirty="0"/>
+              <a:t>TCP  ACK</a:t>
             </a:r>
             <a:endParaRPr lang="zh-CN" altLang="en-US" sz="700" b="1" dirty="0"/>
           </a:p>

</xml_diff>